<commit_message>
fix image in presentation.pptx
</commit_message>
<xml_diff>
--- a/presentation.pptx
+++ b/presentation.pptx
@@ -1,21 +1,21 @@
 
 <file path=ppt/presentation.xml><?xml version="1.0" encoding="utf-8"?>
-<p:presentation xmlns:a="http://schemas.openxmlformats.org/drawingml/2006/main" xmlns:r="http://schemas.openxmlformats.org/officeDocument/2006/relationships" xmlns:p="http://schemas.openxmlformats.org/presentationml/2006/main" xmlns:m="http://schemas.openxmlformats.org/officeDocument/2006/math" xmlns:w="http://schemas.openxmlformats.org/wordprocessingml/2006/main" saveSubsetFonts="1">
+<p:presentation xmlns:a="http://schemas.openxmlformats.org/drawingml/2006/main" xmlns:r="http://schemas.openxmlformats.org/officeDocument/2006/relationships" xmlns:p="http://schemas.openxmlformats.org/presentationml/2006/main" saveSubsetFonts="1">
   <p:sldMasterIdLst>
     <p:sldMasterId id="2147483648" r:id="rId1"/>
   </p:sldMasterIdLst>
   <p:notesMasterIdLst>
-    <p:notesMasterId r:id="rId12"/>
+    <p:notesMasterId r:id="rId10"/>
   </p:notesMasterIdLst>
   <p:sldIdLst>
-    <p:sldId id="256" r:id="rId4"/>
-    <p:sldId id="257" r:id="rId5"/>
-    <p:sldId id="258" r:id="rId6"/>
-    <p:sldId id="259" r:id="rId7"/>
-    <p:sldId id="260" r:id="rId8"/>
-    <p:sldId id="261" r:id="rId9"/>
-    <p:sldId id="262" r:id="rId10"/>
-    <p:sldId id="263" r:id="rId11"/>
+    <p:sldId id="256" r:id="rId2"/>
+    <p:sldId id="257" r:id="rId3"/>
+    <p:sldId id="258" r:id="rId4"/>
+    <p:sldId id="259" r:id="rId5"/>
+    <p:sldId id="260" r:id="rId6"/>
+    <p:sldId id="261" r:id="rId7"/>
+    <p:sldId id="262" r:id="rId8"/>
+    <p:sldId id="263" r:id="rId9"/>
   </p:sldIdLst>
   <p:sldSz cx="12192000" cy="6858000"/>
   <p:notesSz cx="6858000" cy="9144000"/>
@@ -114,12 +114,28 @@
       </a:defRPr>
     </a:lvl9pPr>
   </p:defaultTextStyle>
+  <p:extLst>
+    <p:ext uri="{EFAFB233-063F-42B5-8137-9DF3F51BA10A}">
+      <p15:sldGuideLst xmlns:p15="http://schemas.microsoft.com/office/powerpoint/2012/main">
+        <p15:guide id="1" pos="3840">
+          <p15:clr>
+            <a:srgbClr val="A4A3A4"/>
+          </p15:clr>
+        </p15:guide>
+        <p15:guide id="2" orient="horz" pos="2160">
+          <p15:clr>
+            <a:srgbClr val="A4A3A4"/>
+          </p15:clr>
+        </p15:guide>
+      </p15:sldGuideLst>
+    </p:ext>
+  </p:extLst>
 </p:presentation>
 </file>
 
 <file path=ppt/notesMasters/notesMaster1.xml><?xml version="1.0" encoding="utf-8"?>
 <p:notesMaster xmlns:a="http://schemas.openxmlformats.org/drawingml/2006/main" xmlns:r="http://schemas.openxmlformats.org/officeDocument/2006/relationships" xmlns:p="http://schemas.openxmlformats.org/presentationml/2006/main">
-  <p:cSld name="">
+  <p:cSld>
     <p:bg>
       <p:bgRef idx="1001">
         <a:schemeClr val="bg1"/>
@@ -205,7 +221,7 @@
             </a:pPr>
             <a:fld id="{3632E96E-41F7-40C5-8419-297958CC00FA}" type="datetimeFigureOut">
               <a:rPr lang="en-US"/>
-              <a:t>10/30/2013</a:t>
+              <a:t>11/25/2025</a:t>
             </a:fld>
             <a:endParaRPr lang="en-US"/>
           </a:p>
@@ -215,7 +231,7 @@
         <p:nvSpPr>
           <p:cNvPr id="116953643" name="Slide Image Placeholder 3"/>
           <p:cNvSpPr>
-            <a:spLocks noChangeAspect="1" noGrp="1" noRot="1"/>
+            <a:spLocks noGrp="1" noRot="1" noChangeAspect="1"/>
           </p:cNvSpPr>
           <p:nvPr>
             <p:ph type="sldImg" idx="2"/>
@@ -317,7 +333,6 @@
               <a:rPr lang="en-US"/>
               <a:t>Fifth level</a:t>
             </a:r>
-            <a:endParaRPr lang="en-US"/>
           </a:p>
         </p:txBody>
       </p:sp>
@@ -492,8 +507,8 @@
 </file>
 
 <file path=ppt/notesSlides/notesSlide1.xml><?xml version="1.0" encoding="utf-8"?>
-<p:notes xmlns:a="http://schemas.openxmlformats.org/drawingml/2006/main" xmlns:r="http://schemas.openxmlformats.org/officeDocument/2006/relationships" xmlns:p="http://schemas.openxmlformats.org/presentationml/2006/main" xmlns:m="http://schemas.openxmlformats.org/officeDocument/2006/math" xmlns:w="http://schemas.openxmlformats.org/wordprocessingml/2006/main">
-  <p:cSld name="">
+<p:notes xmlns:a="http://schemas.openxmlformats.org/drawingml/2006/main" xmlns:r="http://schemas.openxmlformats.org/officeDocument/2006/relationships" xmlns:p="http://schemas.openxmlformats.org/presentationml/2006/main">
+  <p:cSld>
     <p:spTree>
       <p:nvGrpSpPr>
         <p:cNvPr id="1" name=""/>
@@ -512,7 +527,7 @@
         <p:nvSpPr>
           <p:cNvPr id="802465929" name="Slide Image Placeholder 1"/>
           <p:cNvSpPr>
-            <a:spLocks noChangeAspect="1" noGrp="1" noRot="1"/>
+            <a:spLocks noGrp="1" noRot="1" noChangeAspect="1"/>
           </p:cNvSpPr>
           <p:nvPr>
             <p:ph type="sldImg"/>
@@ -585,8 +600,8 @@
 </file>
 
 <file path=ppt/notesSlides/notesSlide2.xml><?xml version="1.0" encoding="utf-8"?>
-<p:notes xmlns:a="http://schemas.openxmlformats.org/drawingml/2006/main" xmlns:r="http://schemas.openxmlformats.org/officeDocument/2006/relationships" xmlns:p="http://schemas.openxmlformats.org/presentationml/2006/main" xmlns:m="http://schemas.openxmlformats.org/officeDocument/2006/math" xmlns:w="http://schemas.openxmlformats.org/wordprocessingml/2006/main">
-  <p:cSld name="">
+<p:notes xmlns:a="http://schemas.openxmlformats.org/drawingml/2006/main" xmlns:r="http://schemas.openxmlformats.org/officeDocument/2006/relationships" xmlns:p="http://schemas.openxmlformats.org/presentationml/2006/main">
+  <p:cSld>
     <p:spTree>
       <p:nvGrpSpPr>
         <p:cNvPr id="1" name=""/>
@@ -605,7 +620,7 @@
         <p:nvSpPr>
           <p:cNvPr id="2" name="Slide Image Placeholder 1"/>
           <p:cNvSpPr>
-            <a:spLocks noChangeAspect="1" noGrp="1" noRot="1"/>
+            <a:spLocks noGrp="1" noRot="1" noChangeAspect="1"/>
           </p:cNvSpPr>
           <p:nvPr>
             <p:ph type="sldImg"/>
@@ -655,7 +670,7 @@
             </a:pPr>
             <a:fld id="{7ED31A00-19F7-21B0-3C06-777551C4586B}" type="slidenum">
               <a:rPr/>
-              <a:t/>
+              <a:t>2</a:t>
             </a:fld>
             <a:endParaRPr/>
           </a:p>
@@ -670,8 +685,8 @@
 </file>
 
 <file path=ppt/notesSlides/notesSlide3.xml><?xml version="1.0" encoding="utf-8"?>
-<p:notes xmlns:a="http://schemas.openxmlformats.org/drawingml/2006/main" xmlns:r="http://schemas.openxmlformats.org/officeDocument/2006/relationships" xmlns:p="http://schemas.openxmlformats.org/presentationml/2006/main" xmlns:m="http://schemas.openxmlformats.org/officeDocument/2006/math" xmlns:w="http://schemas.openxmlformats.org/wordprocessingml/2006/main">
-  <p:cSld name="">
+<p:notes xmlns:a="http://schemas.openxmlformats.org/drawingml/2006/main" xmlns:r="http://schemas.openxmlformats.org/officeDocument/2006/relationships" xmlns:p="http://schemas.openxmlformats.org/presentationml/2006/main">
+  <p:cSld>
     <p:spTree>
       <p:nvGrpSpPr>
         <p:cNvPr id="1" name=""/>
@@ -690,7 +705,7 @@
         <p:nvSpPr>
           <p:cNvPr id="2" name="Slide Image Placeholder 1"/>
           <p:cNvSpPr>
-            <a:spLocks noChangeAspect="1" noGrp="1" noRot="1"/>
+            <a:spLocks noGrp="1" noRot="1" noChangeAspect="1"/>
           </p:cNvSpPr>
           <p:nvPr>
             <p:ph type="sldImg"/>
@@ -740,7 +755,7 @@
             </a:pPr>
             <a:fld id="{2FF22F9E-8712-CA05-96DF-4B1170FF827D}" type="slidenum">
               <a:rPr/>
-              <a:t/>
+              <a:t>3</a:t>
             </a:fld>
             <a:endParaRPr/>
           </a:p>
@@ -755,8 +770,8 @@
 </file>
 
 <file path=ppt/notesSlides/notesSlide4.xml><?xml version="1.0" encoding="utf-8"?>
-<p:notes xmlns:a="http://schemas.openxmlformats.org/drawingml/2006/main" xmlns:r="http://schemas.openxmlformats.org/officeDocument/2006/relationships" xmlns:p="http://schemas.openxmlformats.org/presentationml/2006/main" xmlns:m="http://schemas.openxmlformats.org/officeDocument/2006/math" xmlns:w="http://schemas.openxmlformats.org/wordprocessingml/2006/main">
-  <p:cSld name="">
+<p:notes xmlns:a="http://schemas.openxmlformats.org/drawingml/2006/main" xmlns:r="http://schemas.openxmlformats.org/officeDocument/2006/relationships" xmlns:p="http://schemas.openxmlformats.org/presentationml/2006/main">
+  <p:cSld>
     <p:spTree>
       <p:nvGrpSpPr>
         <p:cNvPr id="1" name=""/>
@@ -775,7 +790,7 @@
         <p:nvSpPr>
           <p:cNvPr id="2" name="Slide Image Placeholder 1"/>
           <p:cNvSpPr>
-            <a:spLocks noChangeAspect="1" noGrp="1" noRot="1"/>
+            <a:spLocks noGrp="1" noRot="1" noChangeAspect="1"/>
           </p:cNvSpPr>
           <p:nvPr>
             <p:ph type="sldImg"/>
@@ -825,7 +840,7 @@
             </a:pPr>
             <a:fld id="{3B0DFBA5-99E2-742A-99F7-06414573D788}" type="slidenum">
               <a:rPr/>
-              <a:t/>
+              <a:t>4</a:t>
             </a:fld>
             <a:endParaRPr/>
           </a:p>
@@ -840,8 +855,8 @@
 </file>
 
 <file path=ppt/notesSlides/notesSlide5.xml><?xml version="1.0" encoding="utf-8"?>
-<p:notes xmlns:a="http://schemas.openxmlformats.org/drawingml/2006/main" xmlns:r="http://schemas.openxmlformats.org/officeDocument/2006/relationships" xmlns:p="http://schemas.openxmlformats.org/presentationml/2006/main" xmlns:m="http://schemas.openxmlformats.org/officeDocument/2006/math" xmlns:w="http://schemas.openxmlformats.org/wordprocessingml/2006/main">
-  <p:cSld name="">
+<p:notes xmlns:a="http://schemas.openxmlformats.org/drawingml/2006/main" xmlns:r="http://schemas.openxmlformats.org/officeDocument/2006/relationships" xmlns:p="http://schemas.openxmlformats.org/presentationml/2006/main">
+  <p:cSld>
     <p:spTree>
       <p:nvGrpSpPr>
         <p:cNvPr id="1" name=""/>
@@ -860,7 +875,7 @@
         <p:nvSpPr>
           <p:cNvPr id="2" name="Slide Image Placeholder 1"/>
           <p:cNvSpPr>
-            <a:spLocks noChangeAspect="1" noGrp="1" noRot="1"/>
+            <a:spLocks noGrp="1" noRot="1" noChangeAspect="1"/>
           </p:cNvSpPr>
           <p:nvPr>
             <p:ph type="sldImg"/>
@@ -910,7 +925,7 @@
             </a:pPr>
             <a:fld id="{3B4A4C34-5632-C300-1A45-4910057D3987}" type="slidenum">
               <a:rPr/>
-              <a:t/>
+              <a:t>5</a:t>
             </a:fld>
             <a:endParaRPr/>
           </a:p>
@@ -925,8 +940,8 @@
 </file>
 
 <file path=ppt/notesSlides/notesSlide6.xml><?xml version="1.0" encoding="utf-8"?>
-<p:notes xmlns:a="http://schemas.openxmlformats.org/drawingml/2006/main" xmlns:r="http://schemas.openxmlformats.org/officeDocument/2006/relationships" xmlns:p="http://schemas.openxmlformats.org/presentationml/2006/main" xmlns:m="http://schemas.openxmlformats.org/officeDocument/2006/math" xmlns:w="http://schemas.openxmlformats.org/wordprocessingml/2006/main">
-  <p:cSld name="">
+<p:notes xmlns:a="http://schemas.openxmlformats.org/drawingml/2006/main" xmlns:r="http://schemas.openxmlformats.org/officeDocument/2006/relationships" xmlns:p="http://schemas.openxmlformats.org/presentationml/2006/main">
+  <p:cSld>
     <p:spTree>
       <p:nvGrpSpPr>
         <p:cNvPr id="1" name=""/>
@@ -945,7 +960,7 @@
         <p:nvSpPr>
           <p:cNvPr id="2" name="Slide Image Placeholder 1"/>
           <p:cNvSpPr>
-            <a:spLocks noChangeAspect="1" noGrp="1" noRot="1"/>
+            <a:spLocks noGrp="1" noRot="1" noChangeAspect="1"/>
           </p:cNvSpPr>
           <p:nvPr>
             <p:ph type="sldImg"/>
@@ -995,7 +1010,7 @@
             </a:pPr>
             <a:fld id="{5A528483-4B58-2213-9CEF-3539208646CC}" type="slidenum">
               <a:rPr/>
-              <a:t/>
+              <a:t>6</a:t>
             </a:fld>
             <a:endParaRPr/>
           </a:p>
@@ -1010,8 +1025,8 @@
 </file>
 
 <file path=ppt/notesSlides/notesSlide7.xml><?xml version="1.0" encoding="utf-8"?>
-<p:notes xmlns:a="http://schemas.openxmlformats.org/drawingml/2006/main" xmlns:r="http://schemas.openxmlformats.org/officeDocument/2006/relationships" xmlns:p="http://schemas.openxmlformats.org/presentationml/2006/main" xmlns:m="http://schemas.openxmlformats.org/officeDocument/2006/math" xmlns:w="http://schemas.openxmlformats.org/wordprocessingml/2006/main">
-  <p:cSld name="">
+<p:notes xmlns:a="http://schemas.openxmlformats.org/drawingml/2006/main" xmlns:r="http://schemas.openxmlformats.org/officeDocument/2006/relationships" xmlns:p="http://schemas.openxmlformats.org/presentationml/2006/main">
+  <p:cSld>
     <p:spTree>
       <p:nvGrpSpPr>
         <p:cNvPr id="1" name=""/>
@@ -1030,7 +1045,7 @@
         <p:nvSpPr>
           <p:cNvPr id="2" name="Slide Image Placeholder 1"/>
           <p:cNvSpPr>
-            <a:spLocks noChangeAspect="1" noGrp="1" noRot="1"/>
+            <a:spLocks noGrp="1" noRot="1" noChangeAspect="1"/>
           </p:cNvSpPr>
           <p:nvPr>
             <p:ph type="sldImg"/>
@@ -1080,7 +1095,7 @@
             </a:pPr>
             <a:fld id="{BEFB1598-0076-31E4-EA58-3EBAD6B34B3B}" type="slidenum">
               <a:rPr/>
-              <a:t/>
+              <a:t>7</a:t>
             </a:fld>
             <a:endParaRPr/>
           </a:p>
@@ -1095,8 +1110,8 @@
 </file>
 
 <file path=ppt/notesSlides/notesSlide8.xml><?xml version="1.0" encoding="utf-8"?>
-<p:notes xmlns:a="http://schemas.openxmlformats.org/drawingml/2006/main" xmlns:r="http://schemas.openxmlformats.org/officeDocument/2006/relationships" xmlns:p="http://schemas.openxmlformats.org/presentationml/2006/main" xmlns:m="http://schemas.openxmlformats.org/officeDocument/2006/math" xmlns:w="http://schemas.openxmlformats.org/wordprocessingml/2006/main">
-  <p:cSld name="">
+<p:notes xmlns:a="http://schemas.openxmlformats.org/drawingml/2006/main" xmlns:r="http://schemas.openxmlformats.org/officeDocument/2006/relationships" xmlns:p="http://schemas.openxmlformats.org/presentationml/2006/main">
+  <p:cSld>
     <p:spTree>
       <p:nvGrpSpPr>
         <p:cNvPr id="1" name=""/>
@@ -1115,7 +1130,7 @@
         <p:nvSpPr>
           <p:cNvPr id="2" name="Slide Image Placeholder 1"/>
           <p:cNvSpPr>
-            <a:spLocks noChangeAspect="1" noGrp="1" noRot="1"/>
+            <a:spLocks noGrp="1" noRot="1" noChangeAspect="1"/>
           </p:cNvSpPr>
           <p:nvPr>
             <p:ph type="sldImg"/>
@@ -1165,7 +1180,7 @@
             </a:pPr>
             <a:fld id="{128AD1C4-D294-FE79-D14B-977003915288}" type="slidenum">
               <a:rPr/>
-              <a:t/>
+              <a:t>8</a:t>
             </a:fld>
             <a:endParaRPr/>
           </a:p>
@@ -1180,7 +1195,7 @@
 </file>
 
 <file path=ppt/slideLayouts/slideLayout1.xml><?xml version="1.0" encoding="utf-8"?>
-<p:sldLayout xmlns:a="http://schemas.openxmlformats.org/drawingml/2006/main" xmlns:r="http://schemas.openxmlformats.org/officeDocument/2006/relationships" xmlns:p="http://schemas.openxmlformats.org/presentationml/2006/main" xmlns:m="http://schemas.openxmlformats.org/officeDocument/2006/math" xmlns:w="http://schemas.openxmlformats.org/wordprocessingml/2006/main" matchingName="" preserve="1" showMasterPhAnim="0" showMasterSp="1" type="title" userDrawn="1">
+<p:sldLayout xmlns:a="http://schemas.openxmlformats.org/drawingml/2006/main" xmlns:r="http://schemas.openxmlformats.org/officeDocument/2006/relationships" xmlns:p="http://schemas.openxmlformats.org/presentationml/2006/main" showMasterPhAnim="0" type="title" preserve="1" userDrawn="1">
   <p:cSld name="Title Slide">
     <p:spTree>
       <p:nvGrpSpPr>
@@ -1227,7 +1242,6 @@
               <a:rPr lang="en-US"/>
               <a:t>Click to edit Master title style</a:t>
             </a:r>
-            <a:endParaRPr lang="en-US"/>
           </a:p>
         </p:txBody>
       </p:sp>
@@ -1295,7 +1309,6 @@
               <a:rPr lang="en-US"/>
               <a:t>Click to edit Master subtitle style</a:t>
             </a:r>
-            <a:endParaRPr lang="en-US"/>
           </a:p>
         </p:txBody>
       </p:sp>
@@ -1319,7 +1332,7 @@
             </a:pPr>
             <a:fld id="{BCC18F51-09EC-435C-A3BA-64A766E099C0}" type="datetimeFigureOut">
               <a:rPr lang="en-US"/>
-              <a:t>30.10.2013</a:t>
+              <a:t>11/25/2025</a:t>
             </a:fld>
             <a:endParaRPr lang="en-US"/>
           </a:p>
@@ -1382,7 +1395,7 @@
 </file>
 
 <file path=ppt/slideLayouts/slideLayout10.xml><?xml version="1.0" encoding="utf-8"?>
-<p:sldLayout xmlns:a="http://schemas.openxmlformats.org/drawingml/2006/main" xmlns:r="http://schemas.openxmlformats.org/officeDocument/2006/relationships" xmlns:p="http://schemas.openxmlformats.org/presentationml/2006/main" xmlns:m="http://schemas.openxmlformats.org/officeDocument/2006/math" xmlns:w="http://schemas.openxmlformats.org/wordprocessingml/2006/main" matchingName="" preserve="1" showMasterPhAnim="0" showMasterSp="1" type="vertTx" userDrawn="1">
+<p:sldLayout xmlns:a="http://schemas.openxmlformats.org/drawingml/2006/main" xmlns:r="http://schemas.openxmlformats.org/officeDocument/2006/relationships" xmlns:p="http://schemas.openxmlformats.org/presentationml/2006/main" showMasterPhAnim="0" type="vertTx" preserve="1" userDrawn="1">
   <p:cSld name="Title and Vertical Text">
     <p:spTree>
       <p:nvGrpSpPr>
@@ -1420,7 +1433,6 @@
               <a:rPr lang="en-US"/>
               <a:t>Click to edit Master title style</a:t>
             </a:r>
-            <a:endParaRPr lang="en-US"/>
           </a:p>
         </p:txBody>
       </p:sp>
@@ -1486,7 +1498,6 @@
               <a:rPr lang="en-US"/>
               <a:t>Fifth level</a:t>
             </a:r>
-            <a:endParaRPr lang="en-US"/>
           </a:p>
         </p:txBody>
       </p:sp>
@@ -1510,7 +1521,7 @@
             </a:pPr>
             <a:fld id="{BCC18F51-09EC-435C-A3BA-64A766E099C0}" type="datetimeFigureOut">
               <a:rPr lang="en-US"/>
-              <a:t>30.10.2013</a:t>
+              <a:t>11/25/2025</a:t>
             </a:fld>
             <a:endParaRPr lang="en-US"/>
           </a:p>
@@ -1573,7 +1584,7 @@
 </file>
 
 <file path=ppt/slideLayouts/slideLayout11.xml><?xml version="1.0" encoding="utf-8"?>
-<p:sldLayout xmlns:a="http://schemas.openxmlformats.org/drawingml/2006/main" xmlns:r="http://schemas.openxmlformats.org/officeDocument/2006/relationships" xmlns:p="http://schemas.openxmlformats.org/presentationml/2006/main" xmlns:m="http://schemas.openxmlformats.org/officeDocument/2006/math" xmlns:w="http://schemas.openxmlformats.org/wordprocessingml/2006/main" matchingName="" preserve="1" showMasterPhAnim="0" showMasterSp="1" type="vertTitleAndTx" userDrawn="1">
+<p:sldLayout xmlns:a="http://schemas.openxmlformats.org/drawingml/2006/main" xmlns:r="http://schemas.openxmlformats.org/officeDocument/2006/relationships" xmlns:p="http://schemas.openxmlformats.org/presentationml/2006/main" showMasterPhAnim="0" type="vertTitleAndTx" preserve="1" userDrawn="1">
   <p:cSld name="Vertical Title and Text">
     <p:spTree>
       <p:nvGrpSpPr>
@@ -1616,7 +1627,6 @@
               <a:rPr lang="en-US"/>
               <a:t>Click to edit Master title style</a:t>
             </a:r>
-            <a:endParaRPr lang="en-US"/>
           </a:p>
         </p:txBody>
       </p:sp>
@@ -1687,7 +1697,6 @@
               <a:rPr lang="en-US"/>
               <a:t>Fifth level</a:t>
             </a:r>
-            <a:endParaRPr lang="en-US"/>
           </a:p>
         </p:txBody>
       </p:sp>
@@ -1711,7 +1720,7 @@
             </a:pPr>
             <a:fld id="{BCC18F51-09EC-435C-A3BA-64A766E099C0}" type="datetimeFigureOut">
               <a:rPr lang="en-US"/>
-              <a:t>30.10.2013</a:t>
+              <a:t>11/25/2025</a:t>
             </a:fld>
             <a:endParaRPr lang="en-US"/>
           </a:p>
@@ -1774,7 +1783,7 @@
 </file>
 
 <file path=ppt/slideLayouts/slideLayout2.xml><?xml version="1.0" encoding="utf-8"?>
-<p:sldLayout xmlns:a="http://schemas.openxmlformats.org/drawingml/2006/main" xmlns:r="http://schemas.openxmlformats.org/officeDocument/2006/relationships" xmlns:p="http://schemas.openxmlformats.org/presentationml/2006/main" xmlns:m="http://schemas.openxmlformats.org/officeDocument/2006/math" xmlns:w="http://schemas.openxmlformats.org/wordprocessingml/2006/main" matchingName="" preserve="1" showMasterPhAnim="0" showMasterSp="1" type="obj" userDrawn="1">
+<p:sldLayout xmlns:a="http://schemas.openxmlformats.org/drawingml/2006/main" xmlns:r="http://schemas.openxmlformats.org/officeDocument/2006/relationships" xmlns:p="http://schemas.openxmlformats.org/presentationml/2006/main" showMasterPhAnim="0" type="obj" preserve="1" userDrawn="1">
   <p:cSld name="Title and Content">
     <p:spTree>
       <p:nvGrpSpPr>
@@ -1812,7 +1821,6 @@
               <a:rPr lang="en-US"/>
               <a:t>Click to edit Master title style</a:t>
             </a:r>
-            <a:endParaRPr lang="en-US"/>
           </a:p>
         </p:txBody>
       </p:sp>
@@ -1878,7 +1886,6 @@
               <a:rPr lang="en-US"/>
               <a:t>Fifth level</a:t>
             </a:r>
-            <a:endParaRPr lang="en-US"/>
           </a:p>
         </p:txBody>
       </p:sp>
@@ -1902,7 +1909,7 @@
             </a:pPr>
             <a:fld id="{BCC18F51-09EC-435C-A3BA-64A766E099C0}" type="datetimeFigureOut">
               <a:rPr lang="en-US"/>
-              <a:t>30.10.2013</a:t>
+              <a:t>11/25/2025</a:t>
             </a:fld>
             <a:endParaRPr lang="en-US"/>
           </a:p>
@@ -1965,7 +1972,7 @@
 </file>
 
 <file path=ppt/slideLayouts/slideLayout3.xml><?xml version="1.0" encoding="utf-8"?>
-<p:sldLayout xmlns:a="http://schemas.openxmlformats.org/drawingml/2006/main" xmlns:r="http://schemas.openxmlformats.org/officeDocument/2006/relationships" xmlns:p="http://schemas.openxmlformats.org/presentationml/2006/main" xmlns:m="http://schemas.openxmlformats.org/officeDocument/2006/math" xmlns:w="http://schemas.openxmlformats.org/wordprocessingml/2006/main" matchingName="" preserve="1" showMasterPhAnim="0" showMasterSp="1" type="secHead" userDrawn="1">
+<p:sldLayout xmlns:a="http://schemas.openxmlformats.org/drawingml/2006/main" xmlns:r="http://schemas.openxmlformats.org/officeDocument/2006/relationships" xmlns:p="http://schemas.openxmlformats.org/presentationml/2006/main" showMasterPhAnim="0" type="secHead" preserve="1" userDrawn="1">
   <p:cSld name="Section Header">
     <p:spTree>
       <p:nvGrpSpPr>
@@ -2012,7 +2019,6 @@
               <a:rPr lang="en-US"/>
               <a:t>Click to edit Master title style</a:t>
             </a:r>
-            <a:endParaRPr lang="en-US"/>
           </a:p>
         </p:txBody>
       </p:sp>
@@ -2158,7 +2164,7 @@
             </a:pPr>
             <a:fld id="{BCC18F51-09EC-435C-A3BA-64A766E099C0}" type="datetimeFigureOut">
               <a:rPr lang="en-US"/>
-              <a:t>30.10.2013</a:t>
+              <a:t>11/25/2025</a:t>
             </a:fld>
             <a:endParaRPr lang="en-US"/>
           </a:p>
@@ -2221,7 +2227,7 @@
 </file>
 
 <file path=ppt/slideLayouts/slideLayout4.xml><?xml version="1.0" encoding="utf-8"?>
-<p:sldLayout xmlns:a="http://schemas.openxmlformats.org/drawingml/2006/main" xmlns:r="http://schemas.openxmlformats.org/officeDocument/2006/relationships" xmlns:p="http://schemas.openxmlformats.org/presentationml/2006/main" xmlns:m="http://schemas.openxmlformats.org/officeDocument/2006/math" xmlns:w="http://schemas.openxmlformats.org/wordprocessingml/2006/main" matchingName="" preserve="1" showMasterPhAnim="0" showMasterSp="1" type="twoObj" userDrawn="1">
+<p:sldLayout xmlns:a="http://schemas.openxmlformats.org/drawingml/2006/main" xmlns:r="http://schemas.openxmlformats.org/officeDocument/2006/relationships" xmlns:p="http://schemas.openxmlformats.org/presentationml/2006/main" showMasterPhAnim="0" type="twoObj" preserve="1" userDrawn="1">
   <p:cSld name="Two Content">
     <p:spTree>
       <p:nvGrpSpPr>
@@ -2259,7 +2265,6 @@
               <a:rPr lang="en-US"/>
               <a:t>Click to edit Master title style</a:t>
             </a:r>
-            <a:endParaRPr lang="en-US"/>
           </a:p>
         </p:txBody>
       </p:sp>
@@ -2330,7 +2335,6 @@
               <a:rPr lang="en-US"/>
               <a:t>Fifth level</a:t>
             </a:r>
-            <a:endParaRPr lang="en-US"/>
           </a:p>
         </p:txBody>
       </p:sp>
@@ -2401,7 +2405,6 @@
               <a:rPr lang="en-US"/>
               <a:t>Fifth level</a:t>
             </a:r>
-            <a:endParaRPr lang="en-US"/>
           </a:p>
         </p:txBody>
       </p:sp>
@@ -2425,7 +2428,7 @@
             </a:pPr>
             <a:fld id="{BCC18F51-09EC-435C-A3BA-64A766E099C0}" type="datetimeFigureOut">
               <a:rPr lang="en-US"/>
-              <a:t>30.10.2013</a:t>
+              <a:t>11/25/2025</a:t>
             </a:fld>
             <a:endParaRPr lang="en-US"/>
           </a:p>
@@ -2488,7 +2491,7 @@
 </file>
 
 <file path=ppt/slideLayouts/slideLayout5.xml><?xml version="1.0" encoding="utf-8"?>
-<p:sldLayout xmlns:a="http://schemas.openxmlformats.org/drawingml/2006/main" xmlns:r="http://schemas.openxmlformats.org/officeDocument/2006/relationships" xmlns:p="http://schemas.openxmlformats.org/presentationml/2006/main" xmlns:m="http://schemas.openxmlformats.org/officeDocument/2006/math" xmlns:w="http://schemas.openxmlformats.org/wordprocessingml/2006/main" matchingName="" preserve="1" showMasterPhAnim="0" showMasterSp="1" type="twoTxTwoObj" userDrawn="1">
+<p:sldLayout xmlns:a="http://schemas.openxmlformats.org/drawingml/2006/main" xmlns:r="http://schemas.openxmlformats.org/officeDocument/2006/relationships" xmlns:p="http://schemas.openxmlformats.org/presentationml/2006/main" showMasterPhAnim="0" type="twoTxTwoObj" preserve="1" userDrawn="1">
   <p:cSld name="Comparison">
     <p:spTree>
       <p:nvGrpSpPr>
@@ -2531,7 +2534,6 @@
               <a:rPr lang="en-US"/>
               <a:t>Click to edit Master title style</a:t>
             </a:r>
-            <a:endParaRPr lang="en-US"/>
           </a:p>
         </p:txBody>
       </p:sp>
@@ -2670,7 +2672,6 @@
               <a:rPr lang="en-US"/>
               <a:t>Fifth level</a:t>
             </a:r>
-            <a:endParaRPr lang="en-US"/>
           </a:p>
         </p:txBody>
       </p:sp>
@@ -2809,7 +2810,6 @@
               <a:rPr lang="en-US"/>
               <a:t>Fifth level</a:t>
             </a:r>
-            <a:endParaRPr lang="en-US"/>
           </a:p>
         </p:txBody>
       </p:sp>
@@ -2833,7 +2833,7 @@
             </a:pPr>
             <a:fld id="{BCC18F51-09EC-435C-A3BA-64A766E099C0}" type="datetimeFigureOut">
               <a:rPr lang="en-US"/>
-              <a:t>30.10.2013</a:t>
+              <a:t>11/25/2025</a:t>
             </a:fld>
             <a:endParaRPr lang="en-US"/>
           </a:p>
@@ -2896,7 +2896,7 @@
 </file>
 
 <file path=ppt/slideLayouts/slideLayout6.xml><?xml version="1.0" encoding="utf-8"?>
-<p:sldLayout xmlns:a="http://schemas.openxmlformats.org/drawingml/2006/main" xmlns:r="http://schemas.openxmlformats.org/officeDocument/2006/relationships" xmlns:p="http://schemas.openxmlformats.org/presentationml/2006/main" xmlns:m="http://schemas.openxmlformats.org/officeDocument/2006/math" xmlns:w="http://schemas.openxmlformats.org/wordprocessingml/2006/main" matchingName="" preserve="1" showMasterPhAnim="0" showMasterSp="1" type="titleOnly" userDrawn="1">
+<p:sldLayout xmlns:a="http://schemas.openxmlformats.org/drawingml/2006/main" xmlns:r="http://schemas.openxmlformats.org/officeDocument/2006/relationships" xmlns:p="http://schemas.openxmlformats.org/presentationml/2006/main" showMasterPhAnim="0" type="titleOnly" preserve="1" userDrawn="1">
   <p:cSld name="Title Only">
     <p:spTree>
       <p:nvGrpSpPr>
@@ -2934,7 +2934,6 @@
               <a:rPr lang="en-US"/>
               <a:t>Click to edit Master title style</a:t>
             </a:r>
-            <a:endParaRPr lang="en-US"/>
           </a:p>
         </p:txBody>
       </p:sp>
@@ -2958,7 +2957,7 @@
             </a:pPr>
             <a:fld id="{BCC18F51-09EC-435C-A3BA-64A766E099C0}" type="datetimeFigureOut">
               <a:rPr lang="en-US"/>
-              <a:t>30.10.2013</a:t>
+              <a:t>11/25/2025</a:t>
             </a:fld>
             <a:endParaRPr lang="en-US"/>
           </a:p>
@@ -3021,7 +3020,7 @@
 </file>
 
 <file path=ppt/slideLayouts/slideLayout7.xml><?xml version="1.0" encoding="utf-8"?>
-<p:sldLayout xmlns:a="http://schemas.openxmlformats.org/drawingml/2006/main" xmlns:r="http://schemas.openxmlformats.org/officeDocument/2006/relationships" xmlns:p="http://schemas.openxmlformats.org/presentationml/2006/main" xmlns:m="http://schemas.openxmlformats.org/officeDocument/2006/math" xmlns:w="http://schemas.openxmlformats.org/wordprocessingml/2006/main" matchingName="" preserve="1" showMasterPhAnim="0" showMasterSp="1" type="blank" userDrawn="1">
+<p:sldLayout xmlns:a="http://schemas.openxmlformats.org/drawingml/2006/main" xmlns:r="http://schemas.openxmlformats.org/officeDocument/2006/relationships" xmlns:p="http://schemas.openxmlformats.org/presentationml/2006/main" showMasterPhAnim="0" type="blank" preserve="1" userDrawn="1">
   <p:cSld name="Blank">
     <p:spTree>
       <p:nvGrpSpPr>
@@ -3057,7 +3056,7 @@
             </a:pPr>
             <a:fld id="{BCC18F51-09EC-435C-A3BA-64A766E099C0}" type="datetimeFigureOut">
               <a:rPr lang="en-US"/>
-              <a:t>30.10.2013</a:t>
+              <a:t>11/25/2025</a:t>
             </a:fld>
             <a:endParaRPr lang="en-US"/>
           </a:p>
@@ -3120,7 +3119,7 @@
 </file>
 
 <file path=ppt/slideLayouts/slideLayout8.xml><?xml version="1.0" encoding="utf-8"?>
-<p:sldLayout xmlns:a="http://schemas.openxmlformats.org/drawingml/2006/main" xmlns:r="http://schemas.openxmlformats.org/officeDocument/2006/relationships" xmlns:p="http://schemas.openxmlformats.org/presentationml/2006/main" xmlns:m="http://schemas.openxmlformats.org/officeDocument/2006/math" xmlns:w="http://schemas.openxmlformats.org/wordprocessingml/2006/main" matchingName="" preserve="1" showMasterPhAnim="0" showMasterSp="1" type="objTx" userDrawn="1">
+<p:sldLayout xmlns:a="http://schemas.openxmlformats.org/drawingml/2006/main" xmlns:r="http://schemas.openxmlformats.org/officeDocument/2006/relationships" xmlns:p="http://schemas.openxmlformats.org/presentationml/2006/main" showMasterPhAnim="0" type="objTx" preserve="1" userDrawn="1">
   <p:cSld name="Content with Caption">
     <p:spTree>
       <p:nvGrpSpPr>
@@ -3167,7 +3166,6 @@
               <a:rPr lang="en-US"/>
               <a:t>Click to edit Master title style</a:t>
             </a:r>
-            <a:endParaRPr lang="en-US"/>
           </a:p>
         </p:txBody>
       </p:sp>
@@ -3266,7 +3264,6 @@
               <a:rPr lang="en-US"/>
               <a:t>Fifth level</a:t>
             </a:r>
-            <a:endParaRPr lang="en-US"/>
           </a:p>
         </p:txBody>
       </p:sp>
@@ -3358,7 +3355,7 @@
             </a:pPr>
             <a:fld id="{BCC18F51-09EC-435C-A3BA-64A766E099C0}" type="datetimeFigureOut">
               <a:rPr lang="en-US"/>
-              <a:t>30.10.2013</a:t>
+              <a:t>11/25/2025</a:t>
             </a:fld>
             <a:endParaRPr lang="en-US"/>
           </a:p>
@@ -3421,7 +3418,7 @@
 </file>
 
 <file path=ppt/slideLayouts/slideLayout9.xml><?xml version="1.0" encoding="utf-8"?>
-<p:sldLayout xmlns:a="http://schemas.openxmlformats.org/drawingml/2006/main" xmlns:r="http://schemas.openxmlformats.org/officeDocument/2006/relationships" xmlns:p="http://schemas.openxmlformats.org/presentationml/2006/main" xmlns:m="http://schemas.openxmlformats.org/officeDocument/2006/math" xmlns:w="http://schemas.openxmlformats.org/wordprocessingml/2006/main" matchingName="" preserve="1" showMasterPhAnim="0" showMasterSp="1" type="picTx" userDrawn="1">
+<p:sldLayout xmlns:a="http://schemas.openxmlformats.org/drawingml/2006/main" xmlns:r="http://schemas.openxmlformats.org/officeDocument/2006/relationships" xmlns:p="http://schemas.openxmlformats.org/presentationml/2006/main" showMasterPhAnim="0" type="picTx" preserve="1" userDrawn="1">
   <p:cSld name="Picture with Caption">
     <p:spTree>
       <p:nvGrpSpPr>
@@ -3468,7 +3465,6 @@
               <a:rPr lang="en-US"/>
               <a:t>Click to edit Master title style</a:t>
             </a:r>
-            <a:endParaRPr lang="en-US"/>
           </a:p>
         </p:txBody>
       </p:sp>
@@ -3476,7 +3472,7 @@
         <p:nvSpPr>
           <p:cNvPr id="568865456" name="Picture Placeholder 2"/>
           <p:cNvSpPr>
-            <a:spLocks noChangeAspect="1" noGrp="1"/>
+            <a:spLocks noGrp="1" noChangeAspect="1"/>
           </p:cNvSpPr>
           <p:nvPr>
             <p:ph type="pic" idx="1"/>
@@ -3536,7 +3532,6 @@
               <a:rPr lang="en-US"/>
               <a:t>Click icon to add picture</a:t>
             </a:r>
-            <a:endParaRPr lang="en-US"/>
           </a:p>
         </p:txBody>
       </p:sp>
@@ -3628,7 +3623,7 @@
             </a:pPr>
             <a:fld id="{BCC18F51-09EC-435C-A3BA-64A766E099C0}" type="datetimeFigureOut">
               <a:rPr lang="en-US"/>
-              <a:t>30.10.2013</a:t>
+              <a:t>11/25/2025</a:t>
             </a:fld>
             <a:endParaRPr lang="en-US"/>
           </a:p>
@@ -3691,8 +3686,8 @@
 </file>
 
 <file path=ppt/slideMasters/slideMaster1.xml><?xml version="1.0" encoding="utf-8"?>
-<p:sldMaster xmlns:a="http://schemas.openxmlformats.org/drawingml/2006/main" xmlns:r="http://schemas.openxmlformats.org/officeDocument/2006/relationships" xmlns:p="http://schemas.openxmlformats.org/presentationml/2006/main" xmlns:m="http://schemas.openxmlformats.org/officeDocument/2006/math" xmlns:w="http://schemas.openxmlformats.org/wordprocessingml/2006/main" preserve="0">
-  <p:cSld name="">
+<p:sldMaster xmlns:a="http://schemas.openxmlformats.org/drawingml/2006/main" xmlns:r="http://schemas.openxmlformats.org/officeDocument/2006/relationships" xmlns:p="http://schemas.openxmlformats.org/presentationml/2006/main">
+  <p:cSld>
     <p:bg>
       <p:bgRef idx="1001">
         <a:schemeClr val="bg1"/>
@@ -3744,7 +3739,6 @@
               <a:rPr lang="en-US"/>
               <a:t>Click to edit Master title style</a:t>
             </a:r>
-            <a:endParaRPr lang="en-US"/>
           </a:p>
         </p:txBody>
       </p:sp>
@@ -3820,7 +3814,6 @@
               <a:rPr lang="en-US"/>
               <a:t>Fifth level</a:t>
             </a:r>
-            <a:endParaRPr lang="en-US"/>
           </a:p>
         </p:txBody>
       </p:sp>
@@ -3862,7 +3855,7 @@
             </a:pPr>
             <a:fld id="{BCC18F51-09EC-435C-A3BA-64A766E099C0}" type="datetimeFigureOut">
               <a:rPr lang="en-US"/>
-              <a:t>30.10.2013</a:t>
+              <a:t>11/25/2025</a:t>
             </a:fld>
             <a:endParaRPr lang="en-US"/>
           </a:p>
@@ -4252,8 +4245,8 @@
 </file>
 
 <file path=ppt/slides/slide1.xml><?xml version="1.0" encoding="utf-8"?>
-<p:sld xmlns:a="http://schemas.openxmlformats.org/drawingml/2006/main" xmlns:r="http://schemas.openxmlformats.org/officeDocument/2006/relationships" xmlns:p="http://schemas.openxmlformats.org/presentationml/2006/main" xmlns:m="http://schemas.openxmlformats.org/officeDocument/2006/math" xmlns:w="http://schemas.openxmlformats.org/wordprocessingml/2006/main" xmlns:mc="http://schemas.openxmlformats.org/markup-compatibility/2006" showMasterPhAnim="0" showMasterSp="1" show="1">
-  <p:cSld name="">
+<p:sld xmlns:a="http://schemas.openxmlformats.org/drawingml/2006/main" xmlns:r="http://schemas.openxmlformats.org/officeDocument/2006/relationships" xmlns:p="http://schemas.openxmlformats.org/presentationml/2006/main" showMasterPhAnim="0">
+  <p:cSld>
     <p:spTree>
       <p:nvGrpSpPr>
         <p:cNvPr id="1" name=""/>
@@ -4270,7 +4263,7 @@
       </p:grpSpPr>
       <p:pic>
         <p:nvPicPr>
-          <p:cNvPr id="2029876537" name=""/>
+          <p:cNvPr id="2029876537" name="Picture 2029876536"/>
           <p:cNvPicPr>
             <a:picLocks noChangeAspect="1"/>
           </p:cNvPicPr>
@@ -4281,7 +4274,7 @@
           <a:stretch/>
         </p:blipFill>
         <p:spPr bwMode="auto">
-          <a:xfrm flipH="0" flipV="0">
+          <a:xfrm>
             <a:off x="3941010" y="5452185"/>
             <a:ext cx="3991151" cy="1127207"/>
           </a:xfrm>
@@ -4292,12 +4285,12 @@
       </p:pic>
       <p:sp>
         <p:nvSpPr>
-          <p:cNvPr id="1931106305" name=""/>
+          <p:cNvPr id="1931106305" name="TextBox 1931106304"/>
           <p:cNvSpPr txBox="1"/>
           <p:nvPr/>
         </p:nvSpPr>
         <p:spPr bwMode="auto">
-          <a:xfrm rot="0" flipH="0" flipV="0">
+          <a:xfrm>
             <a:off x="440660" y="1495591"/>
             <a:ext cx="10991850" cy="1737720"/>
           </a:xfrm>
@@ -4307,9 +4300,10 @@
           <a:noFill/>
         </p:spPr>
         <p:txBody>
-          <a:bodyPr vertOverflow="overflow" horzOverflow="overflow" vert="horz" wrap="square" lIns="91440" tIns="45720" rIns="91440" bIns="45720" numCol="1" spcCol="0" rtlCol="0" fromWordArt="0" anchor="t" anchorCtr="0" forceAA="0" upright="0" compatLnSpc="0">
+          <a:bodyPr vertOverflow="overflow" horzOverflow="overflow" vert="horz" wrap="square" lIns="91440" tIns="45720" rIns="91440" bIns="45720" numCol="1" spcCol="0" rtlCol="0" fromWordArt="0" anchor="t" anchorCtr="0" forceAA="0" compatLnSpc="0">
             <a:spAutoFit/>
           </a:bodyPr>
+          <a:lstStyle/>
           <a:p>
             <a:pPr algn="ctr">
               <a:defRPr/>
@@ -4326,12 +4320,12 @@
       </p:sp>
       <p:sp>
         <p:nvSpPr>
-          <p:cNvPr id="1769757381" name=""/>
+          <p:cNvPr id="1769757381" name="TextBox 1769757380"/>
           <p:cNvSpPr txBox="1"/>
           <p:nvPr/>
         </p:nvSpPr>
         <p:spPr bwMode="auto">
-          <a:xfrm rot="0" flipH="0" flipV="0">
+          <a:xfrm>
             <a:off x="2571830" y="3793289"/>
             <a:ext cx="6729511" cy="640440"/>
           </a:xfrm>
@@ -4341,25 +4335,23 @@
           <a:noFill/>
         </p:spPr>
         <p:txBody>
-          <a:bodyPr vertOverflow="overflow" horzOverflow="overflow" vert="horz" wrap="square" lIns="91440" tIns="45720" rIns="91440" bIns="45720" numCol="1" spcCol="0" rtlCol="0" fromWordArt="0" anchor="t" anchorCtr="0" forceAA="0" upright="0" compatLnSpc="0">
+          <a:bodyPr vertOverflow="overflow" horzOverflow="overflow" vert="horz" wrap="square" lIns="91440" tIns="45720" rIns="91440" bIns="45720" numCol="1" spcCol="0" rtlCol="0" fromWordArt="0" anchor="t" anchorCtr="0" forceAA="0" compatLnSpc="0">
             <a:spAutoFit/>
           </a:bodyPr>
+          <a:lstStyle/>
           <a:p>
             <a:pPr algn="ctr">
               <a:defRPr/>
             </a:pPr>
             <a:r>
-              <a:rPr/>
               <a:t>Student: Toni Borozan</a:t>
             </a:r>
-            <a:endParaRPr/>
           </a:p>
           <a:p>
             <a:pPr algn="ctr">
               <a:defRPr/>
             </a:pPr>
             <a:r>
-              <a:rPr/>
               <a:t>Mentor: </a:t>
             </a:r>
             <a:r>
@@ -4382,20 +4374,12 @@
   <p:clrMapOvr>
     <a:masterClrMapping/>
   </p:clrMapOvr>
-  <mc:AlternateContent xmlns:mc="http://schemas.openxmlformats.org/markup-compatibility/2006">
-    <mc:Choice xmlns:p159="http://schemas.microsoft.com/office/powerpoint/2015/09/main" xmlns:p14="http://schemas.microsoft.com/office/powerpoint/2010/main" Requires="p159">
-      <p:transition p14:dur="2000" advClick="1"/>
-    </mc:Choice>
-    <mc:Fallback>
-      <p:transition advClick="1"/>
-    </mc:Fallback>
-  </mc:AlternateContent>
 </p:sld>
 </file>
 
 <file path=ppt/slides/slide2.xml><?xml version="1.0" encoding="utf-8"?>
-<p:sld xmlns:a="http://schemas.openxmlformats.org/drawingml/2006/main" xmlns:r="http://schemas.openxmlformats.org/officeDocument/2006/relationships" xmlns:p="http://schemas.openxmlformats.org/presentationml/2006/main" xmlns:m="http://schemas.openxmlformats.org/officeDocument/2006/math" xmlns:w="http://schemas.openxmlformats.org/wordprocessingml/2006/main" xmlns:mc="http://schemas.openxmlformats.org/markup-compatibility/2006" showMasterPhAnim="0" showMasterSp="1" show="1">
-  <p:cSld name="">
+<p:sld xmlns:a="http://schemas.openxmlformats.org/drawingml/2006/main" xmlns:r="http://schemas.openxmlformats.org/officeDocument/2006/relationships" xmlns:p="http://schemas.openxmlformats.org/presentationml/2006/main" showMasterPhAnim="0">
+  <p:cSld>
     <p:spTree>
       <p:nvGrpSpPr>
         <p:cNvPr id="1" name=""/>
@@ -4429,10 +4413,8 @@
               <a:defRPr/>
             </a:pPr>
             <a:r>
-              <a:rPr/>
               <a:t>Uvod</a:t>
             </a:r>
-            <a:endParaRPr/>
           </a:p>
         </p:txBody>
       </p:sp>
@@ -4455,14 +4437,12 @@
               <a:defRPr/>
             </a:pPr>
             <a:r>
-              <a:rPr/>
               <a:t>Pra</a:t>
             </a:r>
             <a:r>
               <a:rPr lang="hr-HR"/>
               <a:t>ćenje vanjske temperature u realnom vremenu</a:t>
             </a:r>
-            <a:endParaRPr lang="hr-HR"/>
           </a:p>
           <a:p>
             <a:pPr>
@@ -4472,7 +4452,6 @@
               <a:rPr lang="hr-HR"/>
               <a:t>Integracija hardvera i cloud tehnologija</a:t>
             </a:r>
-            <a:endParaRPr lang="hr-HR"/>
           </a:p>
           <a:p>
             <a:pPr>
@@ -4482,7 +4461,6 @@
               <a:rPr lang="hr-HR"/>
               <a:t>Rješavanje ograničenja pristupa podacima</a:t>
             </a:r>
-            <a:endParaRPr lang="hr-HR"/>
           </a:p>
           <a:p>
             <a:pPr>
@@ -4501,20 +4479,12 @@
   <p:clrMapOvr>
     <a:masterClrMapping/>
   </p:clrMapOvr>
-  <mc:AlternateContent xmlns:mc="http://schemas.openxmlformats.org/markup-compatibility/2006">
-    <mc:Choice xmlns:p159="http://schemas.microsoft.com/office/powerpoint/2015/09/main" xmlns:p14="http://schemas.microsoft.com/office/powerpoint/2010/main" Requires="p159">
-      <p:transition p14:dur="2000" advClick="1"/>
-    </mc:Choice>
-    <mc:Fallback>
-      <p:transition advClick="1"/>
-    </mc:Fallback>
-  </mc:AlternateContent>
 </p:sld>
 </file>
 
 <file path=ppt/slides/slide3.xml><?xml version="1.0" encoding="utf-8"?>
-<p:sld xmlns:a="http://schemas.openxmlformats.org/drawingml/2006/main" xmlns:r="http://schemas.openxmlformats.org/officeDocument/2006/relationships" xmlns:p="http://schemas.openxmlformats.org/presentationml/2006/main" xmlns:m="http://schemas.openxmlformats.org/officeDocument/2006/math" xmlns:w="http://schemas.openxmlformats.org/wordprocessingml/2006/main" xmlns:mc="http://schemas.openxmlformats.org/markup-compatibility/2006" showMasterPhAnim="0" showMasterSp="1" show="1">
-  <p:cSld name="">
+<p:sld xmlns:a="http://schemas.openxmlformats.org/drawingml/2006/main" xmlns:r="http://schemas.openxmlformats.org/officeDocument/2006/relationships" xmlns:p="http://schemas.openxmlformats.org/presentationml/2006/main" showMasterPhAnim="0">
+  <p:cSld>
     <p:spTree>
       <p:nvGrpSpPr>
         <p:cNvPr id="1" name=""/>
@@ -4531,14 +4501,14 @@
       </p:grpSpPr>
       <p:cxnSp>
         <p:nvCxnSpPr>
-          <p:cNvPr id="1658115087" name=""/>
+          <p:cNvPr id="1658115087" name="Straight Connector 1658115086"/>
           <p:cNvCxnSpPr>
             <a:endCxn id="1061515450" idx="2"/>
           </p:cNvCxnSpPr>
           <p:nvPr/>
         </p:nvCxnSpPr>
         <p:spPr bwMode="auto">
-          <a:xfrm rot="16199969" flipH="0" flipV="0">
+          <a:xfrm rot="16199969">
             <a:off x="5027501" y="3948837"/>
             <a:ext cx="1618970" cy="0"/>
           </a:xfrm>
@@ -4603,7 +4573,7 @@
           <a:stretch/>
         </p:blipFill>
         <p:spPr bwMode="auto">
-          <a:xfrm rot="0" flipH="0" flipV="0">
+          <a:xfrm>
             <a:off x="1152144" y="1792544"/>
             <a:ext cx="2029968" cy="969264"/>
           </a:xfrm>
@@ -4612,36 +4582,14 @@
           </a:prstGeom>
         </p:spPr>
       </p:pic>
-      <p:pic>
-        <p:nvPicPr>
-          <p:cNvPr id="1013894754" name=""/>
-          <p:cNvPicPr>
-            <a:picLocks noChangeAspect="1"/>
-          </p:cNvPicPr>
-          <p:nvPr/>
-        </p:nvPicPr>
-        <p:blipFill rotWithShape="1">
-          <a:blip r:embed="rId4"/>
-          <a:srcRect l="9522" t="22610" r="10771" b="21676"/>
-        </p:blipFill>
-        <p:spPr bwMode="auto">
-          <a:xfrm flipH="0" flipV="0">
-            <a:off x="1304276" y="4185986"/>
-            <a:ext cx="1637631" cy="1144670"/>
-          </a:xfrm>
-          <a:prstGeom prst="rect">
-            <a:avLst/>
-          </a:prstGeom>
-        </p:spPr>
-      </p:pic>
-      <p:sp>
-        <p:nvSpPr>
-          <p:cNvPr id="1820592863" name=""/>
+      <p:sp>
+        <p:nvSpPr>
+          <p:cNvPr id="1820592863" name="Arc 1820592862"/>
           <p:cNvSpPr/>
           <p:nvPr/>
         </p:nvSpPr>
         <p:spPr bwMode="auto">
-          <a:xfrm rot="8042883" flipH="0" flipV="0">
+          <a:xfrm rot="8042883">
             <a:off x="1881086" y="2583694"/>
             <a:ext cx="509670" cy="534736"/>
           </a:xfrm>
@@ -4668,15 +4616,22 @@
             <a:schemeClr val="tx1"/>
           </a:fontRef>
         </p:style>
-      </p:sp>
-      <p:sp>
-        <p:nvSpPr>
-          <p:cNvPr id="1248539348" name=""/>
+        <p:txBody>
+          <a:bodyPr/>
+          <a:lstStyle/>
+          <a:p>
+            <a:endParaRPr lang="hr-HR"/>
+          </a:p>
+        </p:txBody>
+      </p:sp>
+      <p:sp>
+        <p:nvSpPr>
+          <p:cNvPr id="1248539348" name="Arc 1248539347"/>
           <p:cNvSpPr/>
           <p:nvPr/>
         </p:nvSpPr>
         <p:spPr bwMode="auto">
-          <a:xfrm rot="8042883" flipH="0" flipV="0">
+          <a:xfrm rot="8042883">
             <a:off x="1881086" y="2741549"/>
             <a:ext cx="509670" cy="534735"/>
           </a:xfrm>
@@ -4703,15 +4658,22 @@
             <a:schemeClr val="tx1"/>
           </a:fontRef>
         </p:style>
-      </p:sp>
-      <p:sp>
-        <p:nvSpPr>
-          <p:cNvPr id="2040017966" name=""/>
+        <p:txBody>
+          <a:bodyPr/>
+          <a:lstStyle/>
+          <a:p>
+            <a:endParaRPr lang="hr-HR"/>
+          </a:p>
+        </p:txBody>
+      </p:sp>
+      <p:sp>
+        <p:nvSpPr>
+          <p:cNvPr id="2040017966" name="Arc 2040017965"/>
           <p:cNvSpPr/>
           <p:nvPr/>
         </p:nvSpPr>
         <p:spPr bwMode="auto">
-          <a:xfrm rot="8042883" flipH="0" flipV="0">
+          <a:xfrm rot="8042883">
             <a:off x="1881086" y="3161631"/>
             <a:ext cx="509670" cy="534735"/>
           </a:xfrm>
@@ -4738,15 +4700,22 @@
             <a:schemeClr val="tx1"/>
           </a:fontRef>
         </p:style>
-      </p:sp>
-      <p:sp>
-        <p:nvSpPr>
-          <p:cNvPr id="2016257003" name=""/>
+        <p:txBody>
+          <a:bodyPr/>
+          <a:lstStyle/>
+          <a:p>
+            <a:endParaRPr lang="hr-HR"/>
+          </a:p>
+        </p:txBody>
+      </p:sp>
+      <p:sp>
+        <p:nvSpPr>
+          <p:cNvPr id="2016257003" name="Arc 2016257002"/>
           <p:cNvSpPr/>
           <p:nvPr/>
         </p:nvSpPr>
         <p:spPr bwMode="auto">
-          <a:xfrm rot="8042883" flipH="0" flipV="0">
+          <a:xfrm rot="8042883">
             <a:off x="1881086" y="3319486"/>
             <a:ext cx="509670" cy="534735"/>
           </a:xfrm>
@@ -4773,15 +4742,22 @@
             <a:schemeClr val="tx1"/>
           </a:fontRef>
         </p:style>
-      </p:sp>
-      <p:sp>
-        <p:nvSpPr>
-          <p:cNvPr id="513643813" name=""/>
+        <p:txBody>
+          <a:bodyPr/>
+          <a:lstStyle/>
+          <a:p>
+            <a:endParaRPr lang="hr-HR"/>
+          </a:p>
+        </p:txBody>
+      </p:sp>
+      <p:sp>
+        <p:nvSpPr>
+          <p:cNvPr id="513643813" name="TextBox 513643812"/>
           <p:cNvSpPr txBox="1"/>
           <p:nvPr/>
         </p:nvSpPr>
         <p:spPr bwMode="auto">
-          <a:xfrm rot="0" flipH="0" flipV="0">
+          <a:xfrm>
             <a:off x="1528821" y="3302007"/>
             <a:ext cx="1184572" cy="259439"/>
           </a:xfrm>
@@ -4791,9 +4767,10 @@
           <a:noFill/>
         </p:spPr>
         <p:txBody>
-          <a:bodyPr vertOverflow="overflow" horzOverflow="overflow" vert="horz" wrap="square" lIns="91440" tIns="45720" rIns="91440" bIns="45720" numCol="1" spcCol="0" rtlCol="0" fromWordArt="0" anchor="t" anchorCtr="0" forceAA="0" upright="0" compatLnSpc="0">
+          <a:bodyPr vertOverflow="overflow" horzOverflow="overflow" vert="horz" wrap="square" lIns="91440" tIns="45720" rIns="91440" bIns="45720" numCol="1" spcCol="0" rtlCol="0" fromWordArt="0" anchor="t" anchorCtr="0" forceAA="0" compatLnSpc="0">
             <a:spAutoFit/>
           </a:bodyPr>
+          <a:lstStyle/>
           <a:p>
             <a:pPr algn="ctr">
               <a:defRPr/>
@@ -4808,12 +4785,12 @@
       </p:sp>
       <p:sp>
         <p:nvSpPr>
-          <p:cNvPr id="305957938" name=""/>
+          <p:cNvPr id="305957938" name="Arc 305957937"/>
           <p:cNvSpPr/>
           <p:nvPr/>
         </p:nvSpPr>
         <p:spPr bwMode="auto">
-          <a:xfrm rot="2462561" flipH="0" flipV="0">
+          <a:xfrm rot="2462561">
             <a:off x="3104976" y="4515676"/>
             <a:ext cx="509670" cy="534735"/>
           </a:xfrm>
@@ -4840,15 +4817,22 @@
             <a:schemeClr val="tx1"/>
           </a:fontRef>
         </p:style>
-      </p:sp>
-      <p:sp>
-        <p:nvSpPr>
-          <p:cNvPr id="1228034760" name=""/>
+        <p:txBody>
+          <a:bodyPr/>
+          <a:lstStyle/>
+          <a:p>
+            <a:endParaRPr lang="hr-HR"/>
+          </a:p>
+        </p:txBody>
+      </p:sp>
+      <p:sp>
+        <p:nvSpPr>
+          <p:cNvPr id="1228034760" name="Arc 1228034759"/>
           <p:cNvSpPr/>
           <p:nvPr/>
         </p:nvSpPr>
         <p:spPr bwMode="auto">
-          <a:xfrm rot="2462561" flipH="0" flipV="0">
+          <a:xfrm rot="2462561">
             <a:off x="3290655" y="4515676"/>
             <a:ext cx="509670" cy="534735"/>
           </a:xfrm>
@@ -4875,15 +4859,22 @@
             <a:schemeClr val="tx1"/>
           </a:fontRef>
         </p:style>
-      </p:sp>
-      <p:sp>
-        <p:nvSpPr>
-          <p:cNvPr id="2039900617" name=""/>
+        <p:txBody>
+          <a:bodyPr/>
+          <a:lstStyle/>
+          <a:p>
+            <a:endParaRPr lang="hr-HR"/>
+          </a:p>
+        </p:txBody>
+      </p:sp>
+      <p:sp>
+        <p:nvSpPr>
+          <p:cNvPr id="2039900617" name="Arc 2039900616"/>
           <p:cNvSpPr/>
           <p:nvPr/>
         </p:nvSpPr>
         <p:spPr bwMode="auto">
-          <a:xfrm rot="2462561" flipH="0" flipV="0">
+          <a:xfrm rot="2462561">
             <a:off x="4059459" y="4515676"/>
             <a:ext cx="509670" cy="534735"/>
           </a:xfrm>
@@ -4910,15 +4901,22 @@
             <a:schemeClr val="tx1"/>
           </a:fontRef>
         </p:style>
-      </p:sp>
-      <p:sp>
-        <p:nvSpPr>
-          <p:cNvPr id="750929534" name=""/>
+        <p:txBody>
+          <a:bodyPr/>
+          <a:lstStyle/>
+          <a:p>
+            <a:endParaRPr lang="hr-HR"/>
+          </a:p>
+        </p:txBody>
+      </p:sp>
+      <p:sp>
+        <p:nvSpPr>
+          <p:cNvPr id="750929534" name="Arc 750929533"/>
           <p:cNvSpPr/>
           <p:nvPr/>
         </p:nvSpPr>
         <p:spPr bwMode="auto">
-          <a:xfrm rot="2462561" flipH="0" flipV="0">
+          <a:xfrm rot="2462561">
             <a:off x="4245138" y="4515676"/>
             <a:ext cx="509670" cy="534735"/>
           </a:xfrm>
@@ -4945,15 +4943,22 @@
             <a:schemeClr val="tx1"/>
           </a:fontRef>
         </p:style>
-      </p:sp>
-      <p:sp>
-        <p:nvSpPr>
-          <p:cNvPr id="1411184933" name=""/>
+        <p:txBody>
+          <a:bodyPr/>
+          <a:lstStyle/>
+          <a:p>
+            <a:endParaRPr lang="hr-HR"/>
+          </a:p>
+        </p:txBody>
+      </p:sp>
+      <p:sp>
+        <p:nvSpPr>
+          <p:cNvPr id="1411184933" name="TextBox 1411184932"/>
           <p:cNvSpPr txBox="1"/>
           <p:nvPr/>
         </p:nvSpPr>
         <p:spPr bwMode="auto">
-          <a:xfrm rot="0" flipH="0" flipV="0">
+          <a:xfrm>
             <a:off x="3316313" y="4535183"/>
             <a:ext cx="1631796" cy="427079"/>
           </a:xfrm>
@@ -4963,9 +4968,10 @@
           <a:noFill/>
         </p:spPr>
         <p:txBody>
-          <a:bodyPr vertOverflow="overflow" horzOverflow="overflow" vert="horz" wrap="square" lIns="91440" tIns="45720" rIns="91440" bIns="45720" numCol="1" spcCol="0" rtlCol="0" fromWordArt="0" anchor="t" anchorCtr="0" forceAA="0" upright="0" compatLnSpc="0">
+          <a:bodyPr vertOverflow="overflow" horzOverflow="overflow" vert="horz" wrap="square" lIns="91440" tIns="45720" rIns="91440" bIns="45720" numCol="1" spcCol="0" rtlCol="0" fromWordArt="0" anchor="t" anchorCtr="0" forceAA="0" compatLnSpc="0">
             <a:spAutoFit/>
           </a:bodyPr>
+          <a:lstStyle/>
           <a:p>
             <a:pPr algn="ctr">
               <a:defRPr/>
@@ -4974,7 +4980,6 @@
               <a:rPr sz="1100"/>
               <a:t>Wi-Fi</a:t>
             </a:r>
-            <a:endParaRPr sz="1100"/>
           </a:p>
           <a:p>
             <a:pPr algn="ctr">
@@ -4990,7 +4995,162 @@
       </p:sp>
       <p:pic>
         <p:nvPicPr>
-          <p:cNvPr id="2011252573" name=""/>
+          <p:cNvPr id="2011252573" name="Picture 2011252572"/>
+          <p:cNvPicPr>
+            <a:picLocks noChangeAspect="1"/>
+          </p:cNvPicPr>
+          <p:nvPr/>
+        </p:nvPicPr>
+        <p:blipFill rotWithShape="1">
+          <a:blip r:embed="rId4"/>
+          <a:stretch/>
+        </p:blipFill>
+        <p:spPr bwMode="auto">
+          <a:xfrm>
+            <a:off x="5153158" y="4280274"/>
+            <a:ext cx="1367655" cy="936897"/>
+          </a:xfrm>
+          <a:prstGeom prst="rect">
+            <a:avLst/>
+          </a:prstGeom>
+        </p:spPr>
+      </p:pic>
+      <p:sp>
+        <p:nvSpPr>
+          <p:cNvPr id="1097371131" name="TextBox 1097371130"/>
+          <p:cNvSpPr txBox="1"/>
+          <p:nvPr/>
+        </p:nvSpPr>
+        <p:spPr bwMode="auto">
+          <a:xfrm>
+            <a:off x="1656850" y="2739310"/>
+            <a:ext cx="928154" cy="228960"/>
+          </a:xfrm>
+          <a:prstGeom prst="rect">
+            <a:avLst/>
+          </a:prstGeom>
+          <a:noFill/>
+        </p:spPr>
+        <p:txBody>
+          <a:bodyPr vertOverflow="overflow" horzOverflow="overflow" vert="horz" wrap="square" lIns="91440" tIns="45720" rIns="91440" bIns="45720" numCol="1" spcCol="0" rtlCol="0" fromWordArt="0" anchor="t" anchorCtr="0" forceAA="0" compatLnSpc="0">
+            <a:spAutoFit/>
+          </a:bodyPr>
+          <a:lstStyle/>
+          <a:p>
+            <a:pPr algn="ctr">
+              <a:defRPr/>
+            </a:pPr>
+            <a:r>
+              <a:rPr sz="900"/>
+              <a:t>Ecowitt WS69</a:t>
+            </a:r>
+          </a:p>
+        </p:txBody>
+      </p:sp>
+      <p:sp>
+        <p:nvSpPr>
+          <p:cNvPr id="1632385998" name="TextBox 1632385997"/>
+          <p:cNvSpPr txBox="1"/>
+          <p:nvPr/>
+        </p:nvSpPr>
+        <p:spPr bwMode="auto">
+          <a:xfrm>
+            <a:off x="1540520" y="5266309"/>
+            <a:ext cx="1253214" cy="228960"/>
+          </a:xfrm>
+          <a:prstGeom prst="rect">
+            <a:avLst/>
+          </a:prstGeom>
+          <a:noFill/>
+        </p:spPr>
+        <p:txBody>
+          <a:bodyPr vertOverflow="overflow" horzOverflow="overflow" vert="horz" wrap="square" lIns="91440" tIns="45720" rIns="91440" bIns="45720" numCol="1" spcCol="0" rtlCol="0" fromWordArt="0" anchor="t" anchorCtr="0" forceAA="0" compatLnSpc="0">
+            <a:spAutoFit/>
+          </a:bodyPr>
+          <a:lstStyle/>
+          <a:p>
+            <a:pPr algn="ctr">
+              <a:defRPr/>
+            </a:pPr>
+            <a:r>
+              <a:rPr sz="900"/>
+              <a:t>Ecowitt WS3900</a:t>
+            </a:r>
+          </a:p>
+        </p:txBody>
+      </p:sp>
+      <p:sp>
+        <p:nvSpPr>
+          <p:cNvPr id="1126832089" name="TextBox 1126832088"/>
+          <p:cNvSpPr txBox="1"/>
+          <p:nvPr/>
+        </p:nvSpPr>
+        <p:spPr bwMode="auto">
+          <a:xfrm>
+            <a:off x="5452643" y="5217172"/>
+            <a:ext cx="841166" cy="228960"/>
+          </a:xfrm>
+          <a:prstGeom prst="rect">
+            <a:avLst/>
+          </a:prstGeom>
+          <a:noFill/>
+        </p:spPr>
+        <p:txBody>
+          <a:bodyPr vertOverflow="overflow" horzOverflow="overflow" vert="horz" wrap="square" lIns="91440" tIns="45720" rIns="91440" bIns="45720" numCol="1" spcCol="0" rtlCol="0" fromWordArt="0" anchor="t" anchorCtr="0" forceAA="0" compatLnSpc="0">
+            <a:spAutoFit/>
+          </a:bodyPr>
+          <a:lstStyle/>
+          <a:p>
+            <a:pPr algn="ctr">
+              <a:defRPr/>
+            </a:pPr>
+            <a:r>
+              <a:rPr sz="900"/>
+              <a:t>Usmjernik</a:t>
+            </a:r>
+          </a:p>
+        </p:txBody>
+      </p:sp>
+      <p:sp>
+        <p:nvSpPr>
+          <p:cNvPr id="1061515450" name="TextBox 1061515449"/>
+          <p:cNvSpPr txBox="1"/>
+          <p:nvPr/>
+        </p:nvSpPr>
+        <p:spPr bwMode="auto">
+          <a:xfrm>
+            <a:off x="5369669" y="2773231"/>
+            <a:ext cx="934633" cy="366119"/>
+          </a:xfrm>
+          <a:prstGeom prst="rect">
+            <a:avLst/>
+          </a:prstGeom>
+          <a:noFill/>
+        </p:spPr>
+        <p:txBody>
+          <a:bodyPr vertOverflow="overflow" horzOverflow="overflow" vert="horz" wrap="square" lIns="91440" tIns="45720" rIns="91440" bIns="45720" numCol="1" spcCol="0" rtlCol="0" fromWordArt="0" anchor="t" anchorCtr="0" forceAA="0" compatLnSpc="0">
+            <a:spAutoFit/>
+          </a:bodyPr>
+          <a:lstStyle/>
+          <a:p>
+            <a:pPr algn="ctr">
+              <a:defRPr/>
+            </a:pPr>
+            <a:r>
+              <a:rPr sz="900"/>
+              <a:t>Ra</a:t>
+            </a:r>
+            <a:r>
+              <a:rPr lang="hr-HR" sz="900"/>
+              <a:t>čunalni oblak</a:t>
+            </a:r>
+            <a:endParaRPr sz="900"/>
+          </a:p>
+        </p:txBody>
+      </p:sp>
+      <p:pic>
+        <p:nvPicPr>
+          <p:cNvPr id="112371734" name="Picture 112371733"/>
           <p:cNvPicPr>
             <a:picLocks noChangeAspect="1"/>
           </p:cNvPicPr>
@@ -5001,161 +5161,7 @@
           <a:stretch/>
         </p:blipFill>
         <p:spPr bwMode="auto">
-          <a:xfrm flipH="0" flipV="0">
-            <a:off x="5153158" y="4280274"/>
-            <a:ext cx="1367655" cy="936897"/>
-          </a:xfrm>
-          <a:prstGeom prst="rect">
-            <a:avLst/>
-          </a:prstGeom>
-        </p:spPr>
-      </p:pic>
-      <p:sp>
-        <p:nvSpPr>
-          <p:cNvPr id="1097371131" name=""/>
-          <p:cNvSpPr txBox="1"/>
-          <p:nvPr/>
-        </p:nvSpPr>
-        <p:spPr bwMode="auto">
-          <a:xfrm rot="0" flipH="0" flipV="0">
-            <a:off x="1656850" y="2739310"/>
-            <a:ext cx="928154" cy="228960"/>
-          </a:xfrm>
-          <a:prstGeom prst="rect">
-            <a:avLst/>
-          </a:prstGeom>
-          <a:noFill/>
-        </p:spPr>
-        <p:txBody>
-          <a:bodyPr vertOverflow="overflow" horzOverflow="overflow" vert="horz" wrap="square" lIns="91440" tIns="45720" rIns="91440" bIns="45720" numCol="1" spcCol="0" rtlCol="0" fromWordArt="0" anchor="t" anchorCtr="0" forceAA="0" upright="0" compatLnSpc="0">
-            <a:spAutoFit/>
-          </a:bodyPr>
-          <a:p>
-            <a:pPr algn="ctr">
-              <a:defRPr/>
-            </a:pPr>
-            <a:r>
-              <a:rPr sz="900"/>
-              <a:t>Ecowitt WS69</a:t>
-            </a:r>
-            <a:endParaRPr sz="900"/>
-          </a:p>
-        </p:txBody>
-      </p:sp>
-      <p:sp>
-        <p:nvSpPr>
-          <p:cNvPr id="1632385998" name=""/>
-          <p:cNvSpPr txBox="1"/>
-          <p:nvPr/>
-        </p:nvSpPr>
-        <p:spPr bwMode="auto">
-          <a:xfrm rot="0" flipH="0" flipV="0">
-            <a:off x="1540520" y="5266309"/>
-            <a:ext cx="1253214" cy="228960"/>
-          </a:xfrm>
-          <a:prstGeom prst="rect">
-            <a:avLst/>
-          </a:prstGeom>
-          <a:noFill/>
-        </p:spPr>
-        <p:txBody>
-          <a:bodyPr vertOverflow="overflow" horzOverflow="overflow" vert="horz" wrap="square" lIns="91440" tIns="45720" rIns="91440" bIns="45720" numCol="1" spcCol="0" rtlCol="0" fromWordArt="0" anchor="t" anchorCtr="0" forceAA="0" upright="0" compatLnSpc="0">
-            <a:spAutoFit/>
-          </a:bodyPr>
-          <a:p>
-            <a:pPr algn="ctr">
-              <a:defRPr/>
-            </a:pPr>
-            <a:r>
-              <a:rPr sz="900"/>
-              <a:t>Ecowitt WS3900</a:t>
-            </a:r>
-            <a:endParaRPr sz="900"/>
-          </a:p>
-        </p:txBody>
-      </p:sp>
-      <p:sp>
-        <p:nvSpPr>
-          <p:cNvPr id="1126832089" name=""/>
-          <p:cNvSpPr txBox="1"/>
-          <p:nvPr/>
-        </p:nvSpPr>
-        <p:spPr bwMode="auto">
-          <a:xfrm rot="0" flipH="0" flipV="0">
-            <a:off x="5452643" y="5217172"/>
-            <a:ext cx="841166" cy="228960"/>
-          </a:xfrm>
-          <a:prstGeom prst="rect">
-            <a:avLst/>
-          </a:prstGeom>
-          <a:noFill/>
-        </p:spPr>
-        <p:txBody>
-          <a:bodyPr vertOverflow="overflow" horzOverflow="overflow" vert="horz" wrap="square" lIns="91440" tIns="45720" rIns="91440" bIns="45720" numCol="1" spcCol="0" rtlCol="0" fromWordArt="0" anchor="t" anchorCtr="0" forceAA="0" upright="0" compatLnSpc="0">
-            <a:spAutoFit/>
-          </a:bodyPr>
-          <a:p>
-            <a:pPr algn="ctr">
-              <a:defRPr/>
-            </a:pPr>
-            <a:r>
-              <a:rPr sz="900"/>
-              <a:t>Usmjernik</a:t>
-            </a:r>
-            <a:endParaRPr sz="900"/>
-          </a:p>
-        </p:txBody>
-      </p:sp>
-      <p:sp>
-        <p:nvSpPr>
-          <p:cNvPr id="1061515450" name=""/>
-          <p:cNvSpPr txBox="1"/>
-          <p:nvPr/>
-        </p:nvSpPr>
-        <p:spPr bwMode="auto">
-          <a:xfrm rot="0" flipH="0" flipV="0">
-            <a:off x="5369669" y="2773231"/>
-            <a:ext cx="934633" cy="366119"/>
-          </a:xfrm>
-          <a:prstGeom prst="rect">
-            <a:avLst/>
-          </a:prstGeom>
-          <a:noFill/>
-        </p:spPr>
-        <p:txBody>
-          <a:bodyPr vertOverflow="overflow" horzOverflow="overflow" vert="horz" wrap="square" lIns="91440" tIns="45720" rIns="91440" bIns="45720" numCol="1" spcCol="0" rtlCol="0" fromWordArt="0" anchor="t" anchorCtr="0" forceAA="0" upright="0" compatLnSpc="0">
-            <a:spAutoFit/>
-          </a:bodyPr>
-          <a:p>
-            <a:pPr algn="ctr">
-              <a:defRPr/>
-            </a:pPr>
-            <a:r>
-              <a:rPr sz="900"/>
-              <a:t>Ra</a:t>
-            </a:r>
-            <a:r>
-              <a:rPr lang="hr-HR" sz="900"/>
-              <a:t>čunalni oblak</a:t>
-            </a:r>
-            <a:endParaRPr sz="900"/>
-          </a:p>
-        </p:txBody>
-      </p:sp>
-      <p:pic>
-        <p:nvPicPr>
-          <p:cNvPr id="112371734" name=""/>
-          <p:cNvPicPr>
-            <a:picLocks noChangeAspect="1"/>
-          </p:cNvPicPr>
-          <p:nvPr/>
-        </p:nvPicPr>
-        <p:blipFill rotWithShape="1">
-          <a:blip r:embed="rId6"/>
-          <a:stretch/>
-        </p:blipFill>
-        <p:spPr bwMode="auto">
-          <a:xfrm flipH="0" flipV="0">
+          <a:xfrm>
             <a:off x="5238519" y="1678709"/>
             <a:ext cx="1196934" cy="1196934"/>
           </a:xfrm>
@@ -5166,19 +5172,19 @@
       </p:pic>
       <p:pic>
         <p:nvPicPr>
-          <p:cNvPr id="1889730350" name=""/>
+          <p:cNvPr id="1889730350" name="Picture 1889730349"/>
           <p:cNvPicPr>
             <a:picLocks noChangeAspect="1"/>
           </p:cNvPicPr>
           <p:nvPr/>
         </p:nvPicPr>
         <p:blipFill rotWithShape="1">
-          <a:blip r:embed="rId7"/>
-          <a:srcRect l="15945" t="0" r="16920" b="31764"/>
+          <a:blip r:embed="rId6"/>
+          <a:srcRect l="15945" r="16920" b="31764"/>
           <a:stretch/>
         </p:blipFill>
         <p:spPr bwMode="auto">
-          <a:xfrm flipH="0" flipV="0">
+          <a:xfrm>
             <a:off x="7322035" y="1847221"/>
             <a:ext cx="3769178" cy="2154949"/>
           </a:xfrm>
@@ -5189,7 +5195,29 @@
       </p:pic>
       <p:pic>
         <p:nvPicPr>
-          <p:cNvPr id="1255387357" name=""/>
+          <p:cNvPr id="1255387357" name="Picture 1255387356"/>
+          <p:cNvPicPr>
+            <a:picLocks noChangeAspect="1"/>
+          </p:cNvPicPr>
+          <p:nvPr/>
+        </p:nvPicPr>
+        <p:blipFill rotWithShape="1">
+          <a:blip r:embed="rId7"/>
+          <a:stretch/>
+        </p:blipFill>
+        <p:spPr bwMode="auto">
+          <a:xfrm>
+            <a:off x="8519680" y="2597840"/>
+            <a:ext cx="287329" cy="282938"/>
+          </a:xfrm>
+          <a:prstGeom prst="rect">
+            <a:avLst/>
+          </a:prstGeom>
+        </p:spPr>
+      </p:pic>
+      <p:pic>
+        <p:nvPicPr>
+          <p:cNvPr id="2024559048" name="Picture 2024559047"/>
           <p:cNvPicPr>
             <a:picLocks noChangeAspect="1"/>
           </p:cNvPicPr>
@@ -5200,29 +5228,7 @@
           <a:stretch/>
         </p:blipFill>
         <p:spPr bwMode="auto">
-          <a:xfrm flipH="0" flipV="0">
-            <a:off x="8519680" y="2597840"/>
-            <a:ext cx="287329" cy="282938"/>
-          </a:xfrm>
-          <a:prstGeom prst="rect">
-            <a:avLst/>
-          </a:prstGeom>
-        </p:spPr>
-      </p:pic>
-      <p:pic>
-        <p:nvPicPr>
-          <p:cNvPr id="2024559048" name=""/>
-          <p:cNvPicPr>
-            <a:picLocks noChangeAspect="1"/>
-          </p:cNvPicPr>
-          <p:nvPr/>
-        </p:nvPicPr>
-        <p:blipFill rotWithShape="1">
-          <a:blip r:embed="rId9"/>
-          <a:stretch/>
-        </p:blipFill>
-        <p:spPr bwMode="auto">
-          <a:xfrm rot="0" flipH="0" flipV="0">
+          <a:xfrm>
             <a:off x="8841600" y="2595599"/>
             <a:ext cx="288000" cy="288000"/>
           </a:xfrm>
@@ -5233,18 +5239,54 @@
       </p:pic>
       <p:pic>
         <p:nvPicPr>
-          <p:cNvPr id="1433377742" name=""/>
+          <p:cNvPr id="1433377742" name="Picture 1433377741"/>
           <p:cNvPicPr/>
           <p:nvPr/>
         </p:nvPicPr>
         <p:blipFill rotWithShape="1">
-          <a:blip r:embed="rId10"/>
+          <a:blip r:embed="rId9"/>
           <a:stretch/>
         </p:blipFill>
         <p:spPr bwMode="auto">
-          <a:xfrm rot="0" flipH="0" flipV="0">
+          <a:xfrm>
             <a:off x="9169200" y="2599200"/>
             <a:ext cx="288000" cy="288000"/>
+          </a:xfrm>
+          <a:prstGeom prst="rect">
+            <a:avLst/>
+          </a:prstGeom>
+        </p:spPr>
+      </p:pic>
+      <p:pic>
+        <p:nvPicPr>
+          <p:cNvPr id="3" name="Picture 2" descr="A digital display with numbers and symbols&#10;&#10;AI-generated content may be incorrect.">
+            <a:extLst>
+              <a:ext uri="{FF2B5EF4-FFF2-40B4-BE49-F238E27FC236}">
+                <a16:creationId xmlns:a16="http://schemas.microsoft.com/office/drawing/2014/main" id="{6775C934-B48A-B809-86A5-A420ACEDDD04}"/>
+              </a:ext>
+            </a:extLst>
+          </p:cNvPr>
+          <p:cNvPicPr>
+            <a:picLocks noChangeAspect="1"/>
+          </p:cNvPicPr>
+          <p:nvPr/>
+        </p:nvPicPr>
+        <p:blipFill>
+          <a:blip r:embed="rId10" cstate="print">
+            <a:extLst>
+              <a:ext uri="{28A0092B-C50C-407E-A947-70E740481C1C}">
+                <a14:useLocalDpi xmlns:a14="http://schemas.microsoft.com/office/drawing/2010/main" val="0"/>
+              </a:ext>
+            </a:extLst>
+          </a:blip>
+          <a:stretch>
+            <a:fillRect/>
+          </a:stretch>
+        </p:blipFill>
+        <p:spPr>
+          <a:xfrm>
+            <a:off x="1360706" y="4195189"/>
+            <a:ext cx="1602332" cy="1105394"/>
           </a:xfrm>
           <a:prstGeom prst="rect">
             <a:avLst/>
@@ -5256,14 +5298,6 @@
   <p:clrMapOvr>
     <a:masterClrMapping/>
   </p:clrMapOvr>
-  <mc:AlternateContent xmlns:mc="http://schemas.openxmlformats.org/markup-compatibility/2006">
-    <mc:Choice xmlns:p159="http://schemas.microsoft.com/office/powerpoint/2015/09/main" xmlns:p14="http://schemas.microsoft.com/office/powerpoint/2010/main" Requires="p159">
-      <p:transition p14:dur="2000" advClick="1"/>
-    </mc:Choice>
-    <mc:Fallback>
-      <p:transition advClick="1"/>
-    </mc:Fallback>
-  </mc:AlternateContent>
   <p:timing>
     <p:tnLst>
       <p:par>
@@ -5273,26 +5307,26 @@
               <p:cTn id="2" dur="indefinite" nodeType="mainSeq">
                 <p:childTnLst>
                   <p:par>
-                    <p:cTn id="89" fill="hold">
+                    <p:cTn id="3" fill="hold">
                       <p:stCondLst>
                         <p:cond delay="indefinite"/>
                       </p:stCondLst>
                       <p:childTnLst>
                         <p:par>
-                          <p:cTn id="90" fill="hold">
+                          <p:cTn id="4" fill="hold">
                             <p:stCondLst>
                               <p:cond delay="0"/>
                             </p:stCondLst>
                             <p:childTnLst>
                               <p:par>
-                                <p:cTn id="93" presetID="1" presetClass="entr" presetSubtype="0" fill="hold" grpId="0" nodeType="clickEffect">
+                                <p:cTn id="5" presetID="1" presetClass="entr" presetSubtype="0" fill="hold" nodeType="clickEffect">
                                   <p:stCondLst>
                                     <p:cond delay="0"/>
                                   </p:stCondLst>
                                   <p:childTnLst>
                                     <p:set>
                                       <p:cBhvr>
-                                        <p:cTn id="94" dur="1" fill="hold">
+                                        <p:cTn id="6" dur="1" fill="hold">
                                           <p:stCondLst>
                                             <p:cond delay="0"/>
                                           </p:stCondLst>
@@ -5312,14 +5346,14 @@
                                 </p:cTn>
                               </p:par>
                               <p:par>
-                                <p:cTn id="91" presetID="1" presetClass="entr" presetSubtype="0" fill="hold" grpId="0" nodeType="withEffect">
+                                <p:cTn id="7" presetID="1" presetClass="entr" presetSubtype="0" fill="hold" nodeType="withEffect">
                                   <p:stCondLst>
                                     <p:cond delay="0"/>
                                   </p:stCondLst>
                                   <p:childTnLst>
                                     <p:set>
                                       <p:cBhvr>
-                                        <p:cTn id="92" dur="1" fill="hold">
+                                        <p:cTn id="8" dur="1" fill="hold">
                                           <p:stCondLst>
                                             <p:cond delay="0"/>
                                           </p:stCondLst>
@@ -5345,26 +5379,26 @@
                     </p:cTn>
                   </p:par>
                   <p:par>
-                    <p:cTn id="61" fill="hold">
+                    <p:cTn id="9" fill="hold">
                       <p:stCondLst>
                         <p:cond delay="indefinite"/>
                       </p:stCondLst>
                       <p:childTnLst>
                         <p:par>
-                          <p:cTn id="85" fill="hold">
+                          <p:cTn id="10" fill="hold">
                             <p:stCondLst>
                               <p:cond delay="0"/>
                             </p:stCondLst>
                             <p:childTnLst>
                               <p:par>
-                                <p:cTn id="86" presetID="10" presetClass="entr" presetSubtype="0" fill="hold" grpId="0" nodeType="clickEffect">
+                                <p:cTn id="11" presetID="10" presetClass="entr" presetSubtype="0" fill="hold" nodeType="clickEffect">
                                   <p:stCondLst>
                                     <p:cond delay="0"/>
                                   </p:stCondLst>
                                   <p:childTnLst>
                                     <p:set>
                                       <p:cBhvr>
-                                        <p:cTn id="88" dur="0" fill="hold">
+                                        <p:cTn id="12" dur="0" fill="hold">
                                           <p:stCondLst>
                                             <p:cond delay="0"/>
                                           </p:stCondLst>
@@ -5382,7 +5416,7 @@
                                     </p:set>
                                     <p:animEffect transition="in" filter="fade">
                                       <p:cBhvr>
-                                        <p:cTn id="87" dur="300"/>
+                                        <p:cTn id="13" dur="300"/>
                                         <p:tgtEl>
                                           <p:spTgt spid="1820592863"/>
                                         </p:tgtEl>
@@ -5395,20 +5429,20 @@
                           </p:cTn>
                         </p:par>
                         <p:par>
-                          <p:cTn id="81" fill="hold">
+                          <p:cTn id="14" fill="hold">
                             <p:stCondLst>
                               <p:cond delay="300"/>
                             </p:stCondLst>
                             <p:childTnLst>
                               <p:par>
-                                <p:cTn id="82" presetID="10" presetClass="entr" presetSubtype="0" fill="hold" grpId="0" nodeType="afterEffect">
+                                <p:cTn id="15" presetID="10" presetClass="entr" presetSubtype="0" fill="hold" nodeType="afterEffect">
                                   <p:stCondLst>
                                     <p:cond delay="0"/>
                                   </p:stCondLst>
                                   <p:childTnLst>
                                     <p:set>
                                       <p:cBhvr>
-                                        <p:cTn id="84" dur="0" fill="hold">
+                                        <p:cTn id="16" dur="0" fill="hold">
                                           <p:stCondLst>
                                             <p:cond delay="0"/>
                                           </p:stCondLst>
@@ -5426,7 +5460,7 @@
                                     </p:set>
                                     <p:animEffect transition="in" filter="fade">
                                       <p:cBhvr>
-                                        <p:cTn id="83" dur="300"/>
+                                        <p:cTn id="17" dur="300"/>
                                         <p:tgtEl>
                                           <p:spTgt spid="1248539348"/>
                                         </p:tgtEl>
@@ -5439,20 +5473,20 @@
                           </p:cTn>
                         </p:par>
                         <p:par>
-                          <p:cTn id="77" fill="hold">
+                          <p:cTn id="18" fill="hold">
                             <p:stCondLst>
                               <p:cond delay="600"/>
                             </p:stCondLst>
                             <p:childTnLst>
                               <p:par>
-                                <p:cTn id="78" presetID="10" presetClass="entr" presetSubtype="0" fill="hold" grpId="0" nodeType="afterEffect">
+                                <p:cTn id="19" presetID="10" presetClass="entr" presetSubtype="0" fill="hold" nodeType="afterEffect">
                                   <p:stCondLst>
                                     <p:cond delay="0"/>
                                   </p:stCondLst>
                                   <p:childTnLst>
                                     <p:set>
                                       <p:cBhvr>
-                                        <p:cTn id="80" dur="0" fill="hold">
+                                        <p:cTn id="20" dur="0" fill="hold">
                                           <p:stCondLst>
                                             <p:cond delay="0"/>
                                           </p:stCondLst>
@@ -5470,7 +5504,7 @@
                                     </p:set>
                                     <p:animEffect transition="in" filter="fade">
                                       <p:cBhvr>
-                                        <p:cTn id="79" dur="300"/>
+                                        <p:cTn id="21" dur="300"/>
                                         <p:tgtEl>
                                           <p:spTgt spid="513643813"/>
                                         </p:tgtEl>
@@ -5483,20 +5517,20 @@
                           </p:cTn>
                         </p:par>
                         <p:par>
-                          <p:cTn id="73" fill="hold">
+                          <p:cTn id="22" fill="hold">
                             <p:stCondLst>
                               <p:cond delay="900"/>
                             </p:stCondLst>
                             <p:childTnLst>
                               <p:par>
-                                <p:cTn id="74" presetID="10" presetClass="entr" presetSubtype="0" fill="hold" grpId="0" nodeType="afterEffect">
+                                <p:cTn id="23" presetID="10" presetClass="entr" presetSubtype="0" fill="hold" nodeType="afterEffect">
                                   <p:stCondLst>
                                     <p:cond delay="0"/>
                                   </p:stCondLst>
                                   <p:childTnLst>
                                     <p:set>
                                       <p:cBhvr>
-                                        <p:cTn id="76" dur="0" fill="hold">
+                                        <p:cTn id="24" dur="0" fill="hold">
                                           <p:stCondLst>
                                             <p:cond delay="0"/>
                                           </p:stCondLst>
@@ -5514,7 +5548,7 @@
                                     </p:set>
                                     <p:animEffect transition="in" filter="fade">
                                       <p:cBhvr>
-                                        <p:cTn id="75" dur="300"/>
+                                        <p:cTn id="25" dur="300"/>
                                         <p:tgtEl>
                                           <p:spTgt spid="2040017966"/>
                                         </p:tgtEl>
@@ -5527,20 +5561,20 @@
                           </p:cTn>
                         </p:par>
                         <p:par>
-                          <p:cTn id="69" fill="hold">
+                          <p:cTn id="26" fill="hold">
                             <p:stCondLst>
                               <p:cond delay="1200"/>
                             </p:stCondLst>
                             <p:childTnLst>
                               <p:par>
-                                <p:cTn id="70" presetID="10" presetClass="entr" presetSubtype="0" fill="hold" grpId="0" nodeType="afterEffect">
+                                <p:cTn id="27" presetID="10" presetClass="entr" presetSubtype="0" fill="hold" nodeType="afterEffect">
                                   <p:stCondLst>
                                     <p:cond delay="0"/>
                                   </p:stCondLst>
                                   <p:childTnLst>
                                     <p:set>
                                       <p:cBhvr>
-                                        <p:cTn id="72" dur="0" fill="hold">
+                                        <p:cTn id="28" dur="0" fill="hold">
                                           <p:stCondLst>
                                             <p:cond delay="0"/>
                                           </p:stCondLst>
@@ -5558,7 +5592,7 @@
                                     </p:set>
                                     <p:animEffect transition="in" filter="fade">
                                       <p:cBhvr>
-                                        <p:cTn id="71" dur="300"/>
+                                        <p:cTn id="29" dur="300"/>
                                         <p:tgtEl>
                                           <p:spTgt spid="2016257003"/>
                                         </p:tgtEl>
@@ -5571,26 +5605,26 @@
                           </p:cTn>
                         </p:par>
                         <p:par>
-                          <p:cTn id="62" fill="hold">
+                          <p:cTn id="30" fill="hold">
                             <p:stCondLst>
                               <p:cond delay="1500"/>
                             </p:stCondLst>
                             <p:childTnLst>
                               <p:par>
-                                <p:cTn id="66" presetID="10" presetClass="entr" presetSubtype="0" fill="hold" grpId="0" nodeType="afterEffect">
+                                <p:cTn id="31" presetID="10" presetClass="entr" presetSubtype="0" fill="hold" nodeType="afterEffect">
                                   <p:stCondLst>
                                     <p:cond delay="0"/>
                                   </p:stCondLst>
                                   <p:childTnLst>
                                     <p:set>
                                       <p:cBhvr>
-                                        <p:cTn id="68" dur="1" fill="hold">
+                                        <p:cTn id="32" dur="1" fill="hold">
                                           <p:stCondLst>
                                             <p:cond delay="0"/>
                                           </p:stCondLst>
                                         </p:cTn>
                                         <p:tgtEl>
-                                          <p:spTgt spid="1013894754"/>
+                                          <p:spTgt spid="3"/>
                                         </p:tgtEl>
                                         <p:attrNameLst>
                                           <p:attrName>style.visibility</p:attrName>
@@ -5602,9 +5636,9 @@
                                     </p:set>
                                     <p:animEffect transition="in" filter="fade">
                                       <p:cBhvr>
-                                        <p:cTn id="67" dur="500"/>
+                                        <p:cTn id="33" dur="500"/>
                                         <p:tgtEl>
-                                          <p:spTgt spid="1013894754"/>
+                                          <p:spTgt spid="3"/>
                                         </p:tgtEl>
                                       </p:cBhvr>
                                     </p:animEffect>
@@ -5612,14 +5646,14 @@
                                 </p:cTn>
                               </p:par>
                               <p:par>
-                                <p:cTn id="63" presetID="10" presetClass="entr" presetSubtype="0" fill="hold" grpId="0" nodeType="withEffect">
+                                <p:cTn id="34" presetID="10" presetClass="entr" presetSubtype="0" fill="hold" nodeType="withEffect">
                                   <p:stCondLst>
                                     <p:cond delay="0"/>
                                   </p:stCondLst>
                                   <p:childTnLst>
                                     <p:set>
                                       <p:cBhvr>
-                                        <p:cTn id="65" dur="1" fill="hold">
+                                        <p:cTn id="35" dur="1" fill="hold">
                                           <p:stCondLst>
                                             <p:cond delay="0"/>
                                           </p:stCondLst>
@@ -5637,7 +5671,7 @@
                                     </p:set>
                                     <p:animEffect transition="in" filter="fade">
                                       <p:cBhvr>
-                                        <p:cTn id="64" dur="500"/>
+                                        <p:cTn id="36" dur="500"/>
                                         <p:tgtEl>
                                           <p:spTgt spid="1632385998"/>
                                         </p:tgtEl>
@@ -5653,26 +5687,26 @@
                     </p:cTn>
                   </p:par>
                   <p:par>
-                    <p:cTn id="22" fill="hold">
+                    <p:cTn id="37" fill="hold">
                       <p:stCondLst>
                         <p:cond delay="indefinite"/>
                       </p:stCondLst>
                       <p:childTnLst>
                         <p:par>
-                          <p:cTn id="57" fill="hold">
+                          <p:cTn id="38" fill="hold">
                             <p:stCondLst>
                               <p:cond delay="0"/>
                             </p:stCondLst>
                             <p:childTnLst>
                               <p:par>
-                                <p:cTn id="58" presetID="10" presetClass="entr" presetSubtype="0" fill="hold" grpId="0" nodeType="clickEffect">
+                                <p:cTn id="39" presetID="10" presetClass="entr" presetSubtype="0" fill="hold" nodeType="clickEffect">
                                   <p:stCondLst>
                                     <p:cond delay="0"/>
                                   </p:stCondLst>
                                   <p:childTnLst>
                                     <p:set>
                                       <p:cBhvr>
-                                        <p:cTn id="60" dur="1" fill="hold">
+                                        <p:cTn id="40" dur="1" fill="hold">
                                           <p:stCondLst>
                                             <p:cond delay="0"/>
                                           </p:stCondLst>
@@ -5690,7 +5724,7 @@
                                     </p:set>
                                     <p:animEffect transition="in" filter="fade">
                                       <p:cBhvr>
-                                        <p:cTn id="59" dur="300"/>
+                                        <p:cTn id="41" dur="300"/>
                                         <p:tgtEl>
                                           <p:spTgt spid="305957938"/>
                                         </p:tgtEl>
@@ -5703,20 +5737,20 @@
                           </p:cTn>
                         </p:par>
                         <p:par>
-                          <p:cTn id="53" fill="hold">
+                          <p:cTn id="42" fill="hold">
                             <p:stCondLst>
                               <p:cond delay="300"/>
                             </p:stCondLst>
                             <p:childTnLst>
                               <p:par>
-                                <p:cTn id="54" presetID="10" presetClass="entr" presetSubtype="0" fill="hold" grpId="0" nodeType="afterEffect">
+                                <p:cTn id="43" presetID="10" presetClass="entr" presetSubtype="0" fill="hold" nodeType="afterEffect">
                                   <p:stCondLst>
                                     <p:cond delay="0"/>
                                   </p:stCondLst>
                                   <p:childTnLst>
                                     <p:set>
                                       <p:cBhvr>
-                                        <p:cTn id="56" dur="1" fill="hold">
+                                        <p:cTn id="44" dur="1" fill="hold">
                                           <p:stCondLst>
                                             <p:cond delay="0"/>
                                           </p:stCondLst>
@@ -5734,7 +5768,7 @@
                                     </p:set>
                                     <p:animEffect transition="in" filter="fade">
                                       <p:cBhvr>
-                                        <p:cTn id="55" dur="300"/>
+                                        <p:cTn id="45" dur="300"/>
                                         <p:tgtEl>
                                           <p:spTgt spid="1228034760"/>
                                         </p:tgtEl>
@@ -5747,20 +5781,20 @@
                           </p:cTn>
                         </p:par>
                         <p:par>
-                          <p:cTn id="49" fill="hold">
+                          <p:cTn id="46" fill="hold">
                             <p:stCondLst>
                               <p:cond delay="600"/>
                             </p:stCondLst>
                             <p:childTnLst>
                               <p:par>
-                                <p:cTn id="50" presetID="10" presetClass="entr" presetSubtype="0" fill="hold" grpId="0" nodeType="afterEffect">
+                                <p:cTn id="47" presetID="10" presetClass="entr" presetSubtype="0" fill="hold" nodeType="afterEffect">
                                   <p:stCondLst>
                                     <p:cond delay="0"/>
                                   </p:stCondLst>
                                   <p:childTnLst>
                                     <p:set>
                                       <p:cBhvr>
-                                        <p:cTn id="52" dur="1" fill="hold">
+                                        <p:cTn id="48" dur="1" fill="hold">
                                           <p:stCondLst>
                                             <p:cond delay="0"/>
                                           </p:stCondLst>
@@ -5778,7 +5812,7 @@
                                     </p:set>
                                     <p:animEffect transition="in" filter="fade">
                                       <p:cBhvr>
-                                        <p:cTn id="51" dur="300"/>
+                                        <p:cTn id="49" dur="300"/>
                                         <p:tgtEl>
                                           <p:spTgt spid="1411184933"/>
                                         </p:tgtEl>
@@ -5791,20 +5825,20 @@
                           </p:cTn>
                         </p:par>
                         <p:par>
-                          <p:cTn id="45" fill="hold">
+                          <p:cTn id="50" fill="hold">
                             <p:stCondLst>
                               <p:cond delay="900"/>
                             </p:stCondLst>
                             <p:childTnLst>
                               <p:par>
-                                <p:cTn id="46" presetID="10" presetClass="entr" presetSubtype="0" fill="hold" grpId="0" nodeType="afterEffect">
+                                <p:cTn id="51" presetID="10" presetClass="entr" presetSubtype="0" fill="hold" nodeType="afterEffect">
                                   <p:stCondLst>
                                     <p:cond delay="0"/>
                                   </p:stCondLst>
                                   <p:childTnLst>
                                     <p:set>
                                       <p:cBhvr>
-                                        <p:cTn id="48" dur="1" fill="hold">
+                                        <p:cTn id="52" dur="1" fill="hold">
                                           <p:stCondLst>
                                             <p:cond delay="0"/>
                                           </p:stCondLst>
@@ -5822,7 +5856,7 @@
                                     </p:set>
                                     <p:animEffect transition="in" filter="fade">
                                       <p:cBhvr>
-                                        <p:cTn id="47" dur="300"/>
+                                        <p:cTn id="53" dur="300"/>
                                         <p:tgtEl>
                                           <p:spTgt spid="2039900617"/>
                                         </p:tgtEl>
@@ -5835,20 +5869,20 @@
                           </p:cTn>
                         </p:par>
                         <p:par>
-                          <p:cTn id="41" fill="hold">
+                          <p:cTn id="54" fill="hold">
                             <p:stCondLst>
                               <p:cond delay="1200"/>
                             </p:stCondLst>
                             <p:childTnLst>
                               <p:par>
-                                <p:cTn id="42" presetID="10" presetClass="entr" presetSubtype="0" fill="hold" grpId="0" nodeType="afterEffect">
+                                <p:cTn id="55" presetID="10" presetClass="entr" presetSubtype="0" fill="hold" nodeType="afterEffect">
                                   <p:stCondLst>
                                     <p:cond delay="0"/>
                                   </p:stCondLst>
                                   <p:childTnLst>
                                     <p:set>
                                       <p:cBhvr>
-                                        <p:cTn id="44" dur="1" fill="hold">
+                                        <p:cTn id="56" dur="1" fill="hold">
                                           <p:stCondLst>
                                             <p:cond delay="0"/>
                                           </p:stCondLst>
@@ -5866,7 +5900,7 @@
                                     </p:set>
                                     <p:animEffect transition="in" filter="fade">
                                       <p:cBhvr>
-                                        <p:cTn id="43" dur="300"/>
+                                        <p:cTn id="57" dur="300"/>
                                         <p:tgtEl>
                                           <p:spTgt spid="750929534"/>
                                         </p:tgtEl>
@@ -5879,20 +5913,20 @@
                           </p:cTn>
                         </p:par>
                         <p:par>
-                          <p:cTn id="34" fill="hold">
+                          <p:cTn id="58" fill="hold">
                             <p:stCondLst>
                               <p:cond delay="1500"/>
                             </p:stCondLst>
                             <p:childTnLst>
                               <p:par>
-                                <p:cTn id="38" presetID="10" presetClass="entr" presetSubtype="0" fill="hold" grpId="0" nodeType="afterEffect">
+                                <p:cTn id="59" presetID="10" presetClass="entr" presetSubtype="0" fill="hold" nodeType="afterEffect">
                                   <p:stCondLst>
                                     <p:cond delay="0"/>
                                   </p:stCondLst>
                                   <p:childTnLst>
                                     <p:set>
                                       <p:cBhvr>
-                                        <p:cTn id="40" dur="1" fill="hold">
+                                        <p:cTn id="60" dur="1" fill="hold">
                                           <p:stCondLst>
                                             <p:cond delay="0"/>
                                           </p:stCondLst>
@@ -5910,7 +5944,7 @@
                                     </p:set>
                                     <p:animEffect transition="in" filter="fade">
                                       <p:cBhvr>
-                                        <p:cTn id="39" dur="300"/>
+                                        <p:cTn id="61" dur="300"/>
                                         <p:tgtEl>
                                           <p:spTgt spid="2011252573"/>
                                         </p:tgtEl>
@@ -5920,14 +5954,14 @@
                                 </p:cTn>
                               </p:par>
                               <p:par>
-                                <p:cTn id="35" presetID="10" presetClass="entr" presetSubtype="0" fill="hold" grpId="0" nodeType="withEffect">
+                                <p:cTn id="62" presetID="10" presetClass="entr" presetSubtype="0" fill="hold" nodeType="withEffect">
                                   <p:stCondLst>
                                     <p:cond delay="0"/>
                                   </p:stCondLst>
                                   <p:childTnLst>
                                     <p:set>
                                       <p:cBhvr>
-                                        <p:cTn id="37" dur="1" fill="hold">
+                                        <p:cTn id="63" dur="1" fill="hold">
                                           <p:stCondLst>
                                             <p:cond delay="0"/>
                                           </p:stCondLst>
@@ -5945,7 +5979,7 @@
                                     </p:set>
                                     <p:animEffect transition="in" filter="fade">
                                       <p:cBhvr>
-                                        <p:cTn id="36" dur="300"/>
+                                        <p:cTn id="64" dur="300"/>
                                         <p:tgtEl>
                                           <p:spTgt spid="1126832089"/>
                                         </p:tgtEl>
@@ -5958,20 +5992,20 @@
                           </p:cTn>
                         </p:par>
                         <p:par>
-                          <p:cTn id="30" fill="hold">
+                          <p:cTn id="65" fill="hold">
                             <p:stCondLst>
                               <p:cond delay="1800"/>
                             </p:stCondLst>
                             <p:childTnLst>
                               <p:par>
-                                <p:cTn id="31" presetID="22" presetClass="entr" presetSubtype="4" fill="hold" grpId="0" nodeType="afterEffect">
+                                <p:cTn id="66" presetID="22" presetClass="entr" presetSubtype="4" fill="hold" nodeType="afterEffect">
                                   <p:stCondLst>
                                     <p:cond delay="0"/>
                                   </p:stCondLst>
                                   <p:childTnLst>
                                     <p:set>
                                       <p:cBhvr>
-                                        <p:cTn id="33" dur="1" fill="hold">
+                                        <p:cTn id="67" dur="1" fill="hold">
                                           <p:stCondLst>
                                             <p:cond delay="0"/>
                                           </p:stCondLst>
@@ -5989,7 +6023,7 @@
                                     </p:set>
                                     <p:animEffect transition="in" filter="wipe(down)">
                                       <p:cBhvr>
-                                        <p:cTn id="32" dur="500"/>
+                                        <p:cTn id="68" dur="500"/>
                                         <p:tgtEl>
                                           <p:spTgt spid="1658115087"/>
                                         </p:tgtEl>
@@ -6002,20 +6036,20 @@
                           </p:cTn>
                         </p:par>
                         <p:par>
-                          <p:cTn id="23" fill="hold">
+                          <p:cTn id="69" fill="hold">
                             <p:stCondLst>
                               <p:cond delay="2300"/>
                             </p:stCondLst>
                             <p:childTnLst>
                               <p:par>
-                                <p:cTn id="27" presetID="10" presetClass="entr" presetSubtype="0" fill="hold" grpId="0" nodeType="afterEffect">
+                                <p:cTn id="70" presetID="10" presetClass="entr" presetSubtype="0" fill="hold" nodeType="afterEffect">
                                   <p:stCondLst>
                                     <p:cond delay="0"/>
                                   </p:stCondLst>
                                   <p:childTnLst>
                                     <p:set>
                                       <p:cBhvr>
-                                        <p:cTn id="29" dur="1" fill="hold">
+                                        <p:cTn id="71" dur="1" fill="hold">
                                           <p:stCondLst>
                                             <p:cond delay="0"/>
                                           </p:stCondLst>
@@ -6033,7 +6067,7 @@
                                     </p:set>
                                     <p:animEffect transition="in" filter="fade">
                                       <p:cBhvr>
-                                        <p:cTn id="28" dur="500"/>
+                                        <p:cTn id="72" dur="500"/>
                                         <p:tgtEl>
                                           <p:spTgt spid="1061515450"/>
                                         </p:tgtEl>
@@ -6043,14 +6077,14 @@
                                 </p:cTn>
                               </p:par>
                               <p:par>
-                                <p:cTn id="24" presetID="10" presetClass="entr" presetSubtype="0" fill="hold" grpId="0" nodeType="withEffect">
+                                <p:cTn id="73" presetID="10" presetClass="entr" presetSubtype="0" fill="hold" nodeType="withEffect">
                                   <p:stCondLst>
                                     <p:cond delay="0"/>
                                   </p:stCondLst>
                                   <p:childTnLst>
                                     <p:set>
                                       <p:cBhvr>
-                                        <p:cTn id="26" dur="1" fill="hold">
+                                        <p:cTn id="74" dur="1" fill="hold">
                                           <p:stCondLst>
                                             <p:cond delay="0"/>
                                           </p:stCondLst>
@@ -6068,7 +6102,7 @@
                                     </p:set>
                                     <p:animEffect transition="in" filter="fade">
                                       <p:cBhvr>
-                                        <p:cTn id="25" dur="500"/>
+                                        <p:cTn id="75" dur="500"/>
                                         <p:tgtEl>
                                           <p:spTgt spid="112371734"/>
                                         </p:tgtEl>
@@ -6084,26 +6118,26 @@
                     </p:cTn>
                   </p:par>
                   <p:par>
-                    <p:cTn id="3" fill="hold">
+                    <p:cTn id="76" fill="hold">
                       <p:stCondLst>
                         <p:cond delay="indefinite"/>
                       </p:stCondLst>
                       <p:childTnLst>
                         <p:par>
-                          <p:cTn id="16" fill="hold">
+                          <p:cTn id="77" fill="hold">
                             <p:stCondLst>
                               <p:cond delay="0"/>
                             </p:stCondLst>
                             <p:childTnLst>
                               <p:par>
-                                <p:cTn id="19" presetID="10" presetClass="entr" presetSubtype="0" fill="hold" grpId="0" nodeType="clickEffect">
+                                <p:cTn id="78" presetID="10" presetClass="entr" presetSubtype="0" fill="hold" nodeType="clickEffect">
                                   <p:stCondLst>
                                     <p:cond delay="1000"/>
                                   </p:stCondLst>
                                   <p:childTnLst>
                                     <p:set>
                                       <p:cBhvr>
-                                        <p:cTn id="21" dur="2" fill="hold">
+                                        <p:cTn id="79" dur="2" fill="hold">
                                           <p:stCondLst>
                                             <p:cond delay="0"/>
                                           </p:stCondLst>
@@ -6121,7 +6155,7 @@
                                     </p:set>
                                     <p:animEffect transition="in" filter="fade">
                                       <p:cBhvr>
-                                        <p:cTn id="20" dur="1000"/>
+                                        <p:cTn id="80" dur="1000"/>
                                         <p:tgtEl>
                                           <p:spTgt spid="1889730350"/>
                                         </p:tgtEl>
@@ -6131,14 +6165,14 @@
                                 </p:cTn>
                               </p:par>
                               <p:par>
-                                <p:cTn id="17" presetID="50" presetClass="path" presetSubtype="0" accel="50000" decel="50000" fill="hold" grpId="0" nodeType="withEffect">
+                                <p:cTn id="81" presetID="50" presetClass="path" presetSubtype="0" accel="50000" decel="50000" fill="hold" nodeType="withEffect">
                                   <p:stCondLst>
                                     <p:cond delay="0"/>
                                   </p:stCondLst>
                                   <p:childTnLst>
                                     <p:animMotion origin="layout" path="M -0.268 -0.089 L -0.13 -0.089 C -0.069 -0.089 0 -0.062 0 -0.039 L 0 0" pathEditMode="relative" ptsTypes="">
                                       <p:cBhvr>
-                                        <p:cTn id="18" dur="2000" fill="hold"/>
+                                        <p:cTn id="82" dur="2000" fill="hold"/>
                                         <p:tgtEl>
                                           <p:spTgt spid="1889730350"/>
                                         </p:tgtEl>
@@ -6155,20 +6189,20 @@
                           </p:cTn>
                         </p:par>
                         <p:par>
-                          <p:cTn id="12" fill="hold">
+                          <p:cTn id="83" fill="hold">
                             <p:stCondLst>
                               <p:cond delay="2000"/>
                             </p:stCondLst>
                             <p:childTnLst>
                               <p:par>
-                                <p:cTn id="13" presetID="10" presetClass="entr" presetSubtype="0" fill="hold" grpId="0" nodeType="afterEffect">
+                                <p:cTn id="84" presetID="10" presetClass="entr" presetSubtype="0" fill="hold" nodeType="afterEffect">
                                   <p:stCondLst>
                                     <p:cond delay="1000"/>
                                   </p:stCondLst>
                                   <p:childTnLst>
                                     <p:set>
                                       <p:cBhvr>
-                                        <p:cTn id="15" dur="1" fill="hold">
+                                        <p:cTn id="85" dur="1" fill="hold">
                                           <p:stCondLst>
                                             <p:cond delay="0"/>
                                           </p:stCondLst>
@@ -6186,7 +6220,7 @@
                                     </p:set>
                                     <p:animEffect transition="in" filter="fade">
                                       <p:cBhvr>
-                                        <p:cTn id="14" dur="500"/>
+                                        <p:cTn id="86" dur="500"/>
                                         <p:tgtEl>
                                           <p:spTgt spid="1255387357"/>
                                         </p:tgtEl>
@@ -6199,20 +6233,20 @@
                           </p:cTn>
                         </p:par>
                         <p:par>
-                          <p:cTn id="8" fill="hold">
+                          <p:cTn id="87" fill="hold">
                             <p:stCondLst>
                               <p:cond delay="3500"/>
                             </p:stCondLst>
                             <p:childTnLst>
                               <p:par>
-                                <p:cTn id="9" presetID="10" presetClass="entr" presetSubtype="0" fill="hold" grpId="0" nodeType="afterEffect">
+                                <p:cTn id="88" presetID="10" presetClass="entr" presetSubtype="0" fill="hold" nodeType="afterEffect">
                                   <p:stCondLst>
                                     <p:cond delay="0"/>
                                   </p:stCondLst>
                                   <p:childTnLst>
                                     <p:set>
                                       <p:cBhvr>
-                                        <p:cTn id="11" dur="1" fill="hold">
+                                        <p:cTn id="89" dur="1" fill="hold">
                                           <p:stCondLst>
                                             <p:cond delay="0"/>
                                           </p:stCondLst>
@@ -6230,7 +6264,7 @@
                                     </p:set>
                                     <p:animEffect transition="in" filter="fade">
                                       <p:cBhvr>
-                                        <p:cTn id="10" dur="500"/>
+                                        <p:cTn id="90" dur="500"/>
                                         <p:tgtEl>
                                           <p:spTgt spid="2024559048"/>
                                         </p:tgtEl>
@@ -6243,20 +6277,20 @@
                           </p:cTn>
                         </p:par>
                         <p:par>
-                          <p:cTn id="4" fill="hold">
+                          <p:cTn id="91" fill="hold">
                             <p:stCondLst>
                               <p:cond delay="4000"/>
                             </p:stCondLst>
                             <p:childTnLst>
                               <p:par>
-                                <p:cTn id="5" presetID="10" presetClass="entr" presetSubtype="0" fill="hold" grpId="0" nodeType="afterEffect">
+                                <p:cTn id="92" presetID="10" presetClass="entr" presetSubtype="0" fill="hold" nodeType="afterEffect">
                                   <p:stCondLst>
                                     <p:cond delay="0"/>
                                   </p:stCondLst>
                                   <p:childTnLst>
                                     <p:set>
                                       <p:cBhvr>
-                                        <p:cTn id="7" dur="1" fill="hold">
+                                        <p:cTn id="93" dur="1" fill="hold">
                                           <p:stCondLst>
                                             <p:cond delay="0"/>
                                           </p:stCondLst>
@@ -6274,7 +6308,7 @@
                                     </p:set>
                                     <p:animEffect transition="in" filter="fade">
                                       <p:cBhvr>
-                                        <p:cTn id="6" dur="500"/>
+                                        <p:cTn id="94" dur="500"/>
                                         <p:tgtEl>
                                           <p:spTgt spid="1433377742"/>
                                         </p:tgtEl>
@@ -6315,8 +6349,8 @@
 </file>
 
 <file path=ppt/slides/slide4.xml><?xml version="1.0" encoding="utf-8"?>
-<p:sld xmlns:a="http://schemas.openxmlformats.org/drawingml/2006/main" xmlns:r="http://schemas.openxmlformats.org/officeDocument/2006/relationships" xmlns:p="http://schemas.openxmlformats.org/presentationml/2006/main" xmlns:m="http://schemas.openxmlformats.org/officeDocument/2006/math" xmlns:w="http://schemas.openxmlformats.org/wordprocessingml/2006/main" xmlns:mc="http://schemas.openxmlformats.org/markup-compatibility/2006" showMasterPhAnim="0" showMasterSp="1" show="1">
-  <p:cSld name="">
+<p:sld xmlns:a="http://schemas.openxmlformats.org/drawingml/2006/main" xmlns:r="http://schemas.openxmlformats.org/officeDocument/2006/relationships" xmlns:p="http://schemas.openxmlformats.org/presentationml/2006/main" showMasterPhAnim="0">
+  <p:cSld>
     <p:spTree>
       <p:nvGrpSpPr>
         <p:cNvPr id="1" name=""/>
@@ -6359,7 +6393,7 @@
       </p:sp>
       <p:pic>
         <p:nvPicPr>
-          <p:cNvPr id="377481075" name=""/>
+          <p:cNvPr id="377481075" name="Picture 377481074"/>
           <p:cNvPicPr>
             <a:picLocks noChangeAspect="1"/>
           </p:cNvPicPr>
@@ -6370,7 +6404,7 @@
           <a:stretch/>
         </p:blipFill>
         <p:spPr bwMode="auto">
-          <a:xfrm flipH="0" flipV="0">
+          <a:xfrm>
             <a:off x="1239252" y="1426869"/>
             <a:ext cx="4067194" cy="3043195"/>
           </a:xfrm>
@@ -6381,7 +6415,7 @@
       </p:pic>
       <p:pic>
         <p:nvPicPr>
-          <p:cNvPr id="588357006" name=""/>
+          <p:cNvPr id="588357006" name="Picture 588357005"/>
           <p:cNvPicPr>
             <a:picLocks noChangeAspect="1"/>
           </p:cNvPicPr>
@@ -6392,7 +6426,7 @@
           <a:stretch/>
         </p:blipFill>
         <p:spPr bwMode="auto">
-          <a:xfrm flipH="0" flipV="0">
+          <a:xfrm>
             <a:off x="6183497" y="1452875"/>
             <a:ext cx="4819381" cy="2991184"/>
           </a:xfrm>
@@ -6403,12 +6437,12 @@
       </p:pic>
       <p:sp>
         <p:nvSpPr>
-          <p:cNvPr id="1737479546" name=""/>
+          <p:cNvPr id="1737479546" name="TextBox 1737479545"/>
           <p:cNvSpPr txBox="1"/>
           <p:nvPr/>
         </p:nvSpPr>
         <p:spPr bwMode="auto">
-          <a:xfrm rot="0" flipH="0" flipV="0">
+          <a:xfrm>
             <a:off x="838199" y="4787565"/>
             <a:ext cx="1554798" cy="366119"/>
           </a:xfrm>
@@ -6418,9 +6452,10 @@
           <a:noFill/>
         </p:spPr>
         <p:txBody>
-          <a:bodyPr vertOverflow="overflow" horzOverflow="overflow" vert="horz" wrap="square" lIns="91440" tIns="45720" rIns="91440" bIns="45720" numCol="1" spcCol="0" rtlCol="0" fromWordArt="0" anchor="t" anchorCtr="0" forceAA="0" upright="0" compatLnSpc="0">
+          <a:bodyPr vertOverflow="overflow" horzOverflow="overflow" vert="horz" wrap="square" lIns="91440" tIns="45720" rIns="91440" bIns="45720" numCol="1" spcCol="0" rtlCol="0" fromWordArt="0" anchor="t" anchorCtr="0" forceAA="0" compatLnSpc="0">
             <a:spAutoFit/>
           </a:bodyPr>
+          <a:lstStyle/>
           <a:p>
             <a:pPr>
               <a:defRPr/>
@@ -6435,12 +6470,12 @@
       </p:sp>
       <p:sp>
         <p:nvSpPr>
-          <p:cNvPr id="2130215284" name=""/>
+          <p:cNvPr id="2130215284" name="TextBox 2130215283"/>
           <p:cNvSpPr txBox="1"/>
           <p:nvPr/>
         </p:nvSpPr>
         <p:spPr bwMode="auto">
-          <a:xfrm rot="0" flipH="0" flipV="0">
+          <a:xfrm>
             <a:off x="4746644" y="4787565"/>
             <a:ext cx="1984877" cy="366119"/>
           </a:xfrm>
@@ -6450,9 +6485,10 @@
           <a:noFill/>
         </p:spPr>
         <p:txBody>
-          <a:bodyPr vertOverflow="overflow" horzOverflow="overflow" vert="horz" wrap="square" lIns="91440" tIns="45720" rIns="91440" bIns="45720" numCol="1" spcCol="0" rtlCol="0" fromWordArt="0" anchor="t" anchorCtr="0" forceAA="0" upright="0" compatLnSpc="0">
+          <a:bodyPr vertOverflow="overflow" horzOverflow="overflow" vert="horz" wrap="square" lIns="91440" tIns="45720" rIns="91440" bIns="45720" numCol="1" spcCol="0" rtlCol="0" fromWordArt="0" anchor="t" anchorCtr="0" forceAA="0" compatLnSpc="0">
             <a:spAutoFit/>
           </a:bodyPr>
+          <a:lstStyle/>
           <a:p>
             <a:pPr algn="ctr">
               <a:defRPr/>
@@ -6467,12 +6503,12 @@
       </p:sp>
       <p:sp>
         <p:nvSpPr>
-          <p:cNvPr id="733163621" name=""/>
+          <p:cNvPr id="733163621" name="TextBox 733163620"/>
           <p:cNvSpPr txBox="1"/>
           <p:nvPr/>
         </p:nvSpPr>
         <p:spPr bwMode="auto">
-          <a:xfrm rot="0" flipH="0" flipV="0">
+          <a:xfrm>
             <a:off x="8924276" y="4787565"/>
             <a:ext cx="2168692" cy="366119"/>
           </a:xfrm>
@@ -6482,9 +6518,10 @@
           <a:noFill/>
         </p:spPr>
         <p:txBody>
-          <a:bodyPr vertOverflow="overflow" horzOverflow="overflow" vert="horz" wrap="square" lIns="91440" tIns="45720" rIns="91440" bIns="45720" numCol="1" spcCol="0" rtlCol="0" fromWordArt="0" anchor="t" anchorCtr="0" forceAA="0" upright="0" compatLnSpc="0">
+          <a:bodyPr vertOverflow="overflow" horzOverflow="overflow" vert="horz" wrap="square" lIns="91440" tIns="45720" rIns="91440" bIns="45720" numCol="1" spcCol="0" rtlCol="0" fromWordArt="0" anchor="t" anchorCtr="0" forceAA="0" compatLnSpc="0">
             <a:spAutoFit/>
           </a:bodyPr>
+          <a:lstStyle/>
           <a:p>
             <a:pPr algn="r">
               <a:defRPr/>
@@ -6502,14 +6539,6 @@
   <p:clrMapOvr>
     <a:masterClrMapping/>
   </p:clrMapOvr>
-  <mc:AlternateContent xmlns:mc="http://schemas.openxmlformats.org/markup-compatibility/2006">
-    <mc:Choice xmlns:p159="http://schemas.microsoft.com/office/powerpoint/2015/09/main" xmlns:p14="http://schemas.microsoft.com/office/powerpoint/2010/main" Requires="p159">
-      <p:transition p14:dur="2000" advClick="1"/>
-    </mc:Choice>
-    <mc:Fallback>
-      <p:transition advClick="1"/>
-    </mc:Fallback>
-  </mc:AlternateContent>
   <p:timing>
     <p:tnLst>
       <p:par>
@@ -6531,14 +6560,14 @@
                             </p:stCondLst>
                             <p:childTnLst>
                               <p:par>
-                                <p:cTn id="9" presetID="1" presetClass="entr" presetSubtype="0" fill="hold" grpId="0" nodeType="clickEffect">
+                                <p:cTn id="5" presetID="1" presetClass="entr" presetSubtype="0" fill="hold" nodeType="clickEffect">
                                   <p:stCondLst>
                                     <p:cond delay="0"/>
                                   </p:stCondLst>
                                   <p:childTnLst>
                                     <p:set>
                                       <p:cBhvr>
-                                        <p:cTn id="10" dur="1" fill="hold">
+                                        <p:cTn id="6" dur="1" fill="hold">
                                           <p:stCondLst>
                                             <p:cond delay="0"/>
                                           </p:stCondLst>
@@ -6558,7 +6587,7 @@
                                 </p:cTn>
                               </p:par>
                               <p:par>
-                                <p:cTn id="7" presetID="1" presetClass="entr" presetSubtype="0" fill="hold" grpId="0" nodeType="withEffect">
+                                <p:cTn id="7" presetID="1" presetClass="entr" presetSubtype="0" fill="hold" nodeType="withEffect">
                                   <p:stCondLst>
                                     <p:cond delay="0"/>
                                   </p:stCondLst>
@@ -6585,14 +6614,14 @@
                                 </p:cTn>
                               </p:par>
                               <p:par>
-                                <p:cTn id="5" presetID="1" presetClass="entr" presetSubtype="0" fill="hold" grpId="0" nodeType="withEffect">
+                                <p:cTn id="9" presetID="1" presetClass="entr" presetSubtype="0" fill="hold" nodeType="withEffect">
                                   <p:stCondLst>
                                     <p:cond delay="0"/>
                                   </p:stCondLst>
                                   <p:childTnLst>
                                     <p:set>
                                       <p:cBhvr>
-                                        <p:cTn id="6" dur="1" fill="hold">
+                                        <p:cTn id="10" dur="1" fill="hold">
                                           <p:stCondLst>
                                             <p:cond delay="0"/>
                                           </p:stCondLst>
@@ -6643,8 +6672,8 @@
 </file>
 
 <file path=ppt/slides/slide5.xml><?xml version="1.0" encoding="utf-8"?>
-<p:sld xmlns:a="http://schemas.openxmlformats.org/drawingml/2006/main" xmlns:r="http://schemas.openxmlformats.org/officeDocument/2006/relationships" xmlns:p="http://schemas.openxmlformats.org/presentationml/2006/main" xmlns:m="http://schemas.openxmlformats.org/officeDocument/2006/math" xmlns:w="http://schemas.openxmlformats.org/wordprocessingml/2006/main" xmlns:mc="http://schemas.openxmlformats.org/markup-compatibility/2006" showMasterPhAnim="0" showMasterSp="1" show="1">
-  <p:cSld name="">
+<p:sld xmlns:a="http://schemas.openxmlformats.org/drawingml/2006/main" xmlns:r="http://schemas.openxmlformats.org/officeDocument/2006/relationships" xmlns:p="http://schemas.openxmlformats.org/presentationml/2006/main" showMasterPhAnim="0">
+  <p:cSld>
     <p:spTree>
       <p:nvGrpSpPr>
         <p:cNvPr id="1" name=""/>
@@ -6707,7 +6736,6 @@
               <a:rPr lang="hr-HR"/>
               <a:t>Docker</a:t>
             </a:r>
-            <a:endParaRPr lang="hr-HR"/>
           </a:p>
           <a:p>
             <a:pPr>
@@ -6717,7 +6745,6 @@
               <a:rPr lang="hr-HR"/>
               <a:t>.NET Web API</a:t>
             </a:r>
-            <a:endParaRPr lang="hr-HR"/>
           </a:p>
           <a:p>
             <a:pPr>
@@ -6727,7 +6754,6 @@
               <a:rPr lang="hr-HR"/>
               <a:t>PosgreSQL</a:t>
             </a:r>
-            <a:endParaRPr lang="hr-HR"/>
           </a:p>
           <a:p>
             <a:pPr>
@@ -6737,7 +6763,6 @@
               <a:rPr lang="hr-HR"/>
               <a:t>Grafana</a:t>
             </a:r>
-            <a:endParaRPr lang="hr-HR"/>
           </a:p>
           <a:p>
             <a:pPr>
@@ -6749,7 +6774,7 @@
       </p:sp>
       <p:pic>
         <p:nvPicPr>
-          <p:cNvPr id="1881280182" name=""/>
+          <p:cNvPr id="1881280182" name="Picture 1881280181"/>
           <p:cNvPicPr>
             <a:picLocks noChangeAspect="1"/>
           </p:cNvPicPr>
@@ -6760,7 +6785,7 @@
           <a:stretch/>
         </p:blipFill>
         <p:spPr bwMode="auto">
-          <a:xfrm flipH="0" flipV="0">
+          <a:xfrm>
             <a:off x="6601512" y="2186934"/>
             <a:ext cx="3939152" cy="682596"/>
           </a:xfrm>
@@ -6771,7 +6796,7 @@
       </p:pic>
       <p:pic>
         <p:nvPicPr>
-          <p:cNvPr id="1922842263" name=""/>
+          <p:cNvPr id="1922842263" name="Picture 1922842262"/>
           <p:cNvPicPr>
             <a:picLocks noChangeAspect="1"/>
           </p:cNvPicPr>
@@ -6782,7 +6807,7 @@
           <a:stretch/>
         </p:blipFill>
         <p:spPr bwMode="auto">
-          <a:xfrm flipH="0" flipV="0">
+          <a:xfrm>
             <a:off x="6601512" y="3525169"/>
             <a:ext cx="3645718" cy="2651793"/>
           </a:xfrm>
@@ -6796,20 +6821,12 @@
   <p:clrMapOvr>
     <a:masterClrMapping/>
   </p:clrMapOvr>
-  <mc:AlternateContent xmlns:mc="http://schemas.openxmlformats.org/markup-compatibility/2006">
-    <mc:Choice xmlns:p159="http://schemas.microsoft.com/office/powerpoint/2015/09/main" xmlns:p14="http://schemas.microsoft.com/office/powerpoint/2010/main" Requires="p159">
-      <p:transition p14:dur="2000" advClick="1"/>
-    </mc:Choice>
-    <mc:Fallback>
-      <p:transition advClick="1"/>
-    </mc:Fallback>
-  </mc:AlternateContent>
 </p:sld>
 </file>
 
 <file path=ppt/slides/slide6.xml><?xml version="1.0" encoding="utf-8"?>
-<p:sld xmlns:a="http://schemas.openxmlformats.org/drawingml/2006/main" xmlns:r="http://schemas.openxmlformats.org/officeDocument/2006/relationships" xmlns:p="http://schemas.openxmlformats.org/presentationml/2006/main" xmlns:m="http://schemas.openxmlformats.org/officeDocument/2006/math" xmlns:w="http://schemas.openxmlformats.org/wordprocessingml/2006/main" xmlns:mc="http://schemas.openxmlformats.org/markup-compatibility/2006" showMasterPhAnim="0" showMasterSp="1" show="1">
-  <p:cSld name="">
+<p:sld xmlns:a="http://schemas.openxmlformats.org/drawingml/2006/main" xmlns:r="http://schemas.openxmlformats.org/officeDocument/2006/relationships" xmlns:p="http://schemas.openxmlformats.org/presentationml/2006/main" showMasterPhAnim="0">
+  <p:cSld>
     <p:spTree>
       <p:nvGrpSpPr>
         <p:cNvPr id="1" name=""/>
@@ -6864,20 +6881,12 @@
   <p:clrMapOvr>
     <a:masterClrMapping/>
   </p:clrMapOvr>
-  <mc:AlternateContent xmlns:mc="http://schemas.openxmlformats.org/markup-compatibility/2006">
-    <mc:Choice xmlns:p159="http://schemas.microsoft.com/office/powerpoint/2015/09/main" xmlns:p14="http://schemas.microsoft.com/office/powerpoint/2010/main" Requires="p159">
-      <p:transition p14:dur="2000" advClick="1"/>
-    </mc:Choice>
-    <mc:Fallback>
-      <p:transition advClick="1"/>
-    </mc:Fallback>
-  </mc:AlternateContent>
 </p:sld>
 </file>
 
 <file path=ppt/slides/slide7.xml><?xml version="1.0" encoding="utf-8"?>
-<p:sld xmlns:a="http://schemas.openxmlformats.org/drawingml/2006/main" xmlns:r="http://schemas.openxmlformats.org/officeDocument/2006/relationships" xmlns:p="http://schemas.openxmlformats.org/presentationml/2006/main" xmlns:m="http://schemas.openxmlformats.org/officeDocument/2006/math" xmlns:w="http://schemas.openxmlformats.org/wordprocessingml/2006/main" xmlns:mc="http://schemas.openxmlformats.org/markup-compatibility/2006" showMasterPhAnim="0" showMasterSp="1" show="1">
-  <p:cSld name="">
+<p:sld xmlns:a="http://schemas.openxmlformats.org/drawingml/2006/main" xmlns:r="http://schemas.openxmlformats.org/officeDocument/2006/relationships" xmlns:p="http://schemas.openxmlformats.org/presentationml/2006/main" showMasterPhAnim="0">
+  <p:cSld>
     <p:spTree>
       <p:nvGrpSpPr>
         <p:cNvPr id="1" name=""/>
@@ -6938,13 +6947,8 @@
             </a:pPr>
             <a:r>
               <a:rPr lang="hr-HR"/>
-              <a:t>Robusna integracija</a:t>
-            </a:r>
-            <a:r>
-              <a:rPr lang="hr-HR"/>
-              <a:t> hardvera i softvera</a:t>
-            </a:r>
-            <a:endParaRPr lang="hr-HR"/>
+              <a:t>Robusna integracija hardvera i softvera</a:t>
+            </a:r>
           </a:p>
           <a:p>
             <a:pPr>
@@ -6954,7 +6958,6 @@
               <a:rPr lang="hr-HR"/>
               <a:t>Nadzor okoline u realnom vremenu</a:t>
             </a:r>
-            <a:endParaRPr lang="hr-HR"/>
           </a:p>
           <a:p>
             <a:pPr>
@@ -6964,7 +6967,6 @@
               <a:rPr lang="hr-HR"/>
               <a:t>Skalabilna i održavana arhitektura</a:t>
             </a:r>
-            <a:endParaRPr lang="hr-HR"/>
           </a:p>
           <a:p>
             <a:pPr>
@@ -6974,7 +6976,6 @@
               <a:rPr lang="hr-HR"/>
               <a:t>Automatska konfiguracija</a:t>
             </a:r>
-            <a:endParaRPr lang="hr-HR"/>
           </a:p>
         </p:txBody>
       </p:sp>
@@ -6983,20 +6984,12 @@
   <p:clrMapOvr>
     <a:masterClrMapping/>
   </p:clrMapOvr>
-  <mc:AlternateContent xmlns:mc="http://schemas.openxmlformats.org/markup-compatibility/2006">
-    <mc:Choice xmlns:p159="http://schemas.microsoft.com/office/powerpoint/2015/09/main" xmlns:p14="http://schemas.microsoft.com/office/powerpoint/2010/main" Requires="p159">
-      <p:transition p14:dur="2000" advClick="1"/>
-    </mc:Choice>
-    <mc:Fallback>
-      <p:transition advClick="1"/>
-    </mc:Fallback>
-  </mc:AlternateContent>
 </p:sld>
 </file>
 
 <file path=ppt/slides/slide8.xml><?xml version="1.0" encoding="utf-8"?>
-<p:sld xmlns:a="http://schemas.openxmlformats.org/drawingml/2006/main" xmlns:r="http://schemas.openxmlformats.org/officeDocument/2006/relationships" xmlns:p="http://schemas.openxmlformats.org/presentationml/2006/main" xmlns:m="http://schemas.openxmlformats.org/officeDocument/2006/math" xmlns:w="http://schemas.openxmlformats.org/wordprocessingml/2006/main" xmlns:mc="http://schemas.openxmlformats.org/markup-compatibility/2006" showMasterPhAnim="0" showMasterSp="1" show="1">
-  <p:cSld name="">
+<p:sld xmlns:a="http://schemas.openxmlformats.org/drawingml/2006/main" xmlns:r="http://schemas.openxmlformats.org/officeDocument/2006/relationships" xmlns:p="http://schemas.openxmlformats.org/presentationml/2006/main" showMasterPhAnim="0">
+  <p:cSld>
     <p:spTree>
       <p:nvGrpSpPr>
         <p:cNvPr id="1" name=""/>
@@ -7051,19 +7044,11 @@
   <p:clrMapOvr>
     <a:masterClrMapping/>
   </p:clrMapOvr>
-  <mc:AlternateContent xmlns:mc="http://schemas.openxmlformats.org/markup-compatibility/2006">
-    <mc:Choice xmlns:p159="http://schemas.microsoft.com/office/powerpoint/2015/09/main" xmlns:p14="http://schemas.microsoft.com/office/powerpoint/2010/main" Requires="p159">
-      <p:transition p14:dur="2000" advClick="1"/>
-    </mc:Choice>
-    <mc:Fallback>
-      <p:transition advClick="1"/>
-    </mc:Fallback>
-  </mc:AlternateContent>
 </p:sld>
 </file>
 
 <file path=ppt/theme/theme1.xml><?xml version="1.0" encoding="utf-8"?>
-<a:theme xmlns:a="http://schemas.openxmlformats.org/drawingml/2006/main" xmlns:r="http://schemas.openxmlformats.org/officeDocument/2006/relationships" xmlns:p="http://schemas.openxmlformats.org/presentationml/2006/main" name="Office Theme">
+<a:theme xmlns:a="http://schemas.openxmlformats.org/drawingml/2006/main" name="Office Theme">
   <a:themeElements>
     <a:clrScheme name="New Office">
       <a:dk1>
@@ -7254,11 +7239,12 @@
     </a:fmtScheme>
   </a:themeElements>
   <a:objectDefaults/>
+  <a:extraClrSchemeLst/>
 </a:theme>
 </file>
 
 <file path=ppt/theme/theme2.xml><?xml version="1.0" encoding="utf-8"?>
-<a:theme xmlns:a="http://schemas.openxmlformats.org/drawingml/2006/main" xmlns:r="http://schemas.openxmlformats.org/officeDocument/2006/relationships" xmlns:p="http://schemas.openxmlformats.org/presentationml/2006/main" name="Office Theme">
+<a:theme xmlns:a="http://schemas.openxmlformats.org/drawingml/2006/main" name="Office Theme">
   <a:themeElements>
     <a:clrScheme name="Office">
       <a:dk1>
@@ -7449,5 +7435,6 @@
     </a:fmtScheme>
   </a:themeElements>
   <a:objectDefaults/>
+  <a:extraClrSchemeLst/>
 </a:theme>
 </file>
</xml_diff>